<commit_message>
Making Main Page,User,Club, and Company on Powerpoint
</commit_message>
<xml_diff>
--- a/Website PDF/Power Point.pptx
+++ b/Website PDF/Power Point.pptx
@@ -7,6 +7,9 @@
   <p:sldIdLst>
     <p:sldId id="257" r:id="rId2"/>
     <p:sldId id="256" r:id="rId3"/>
+    <p:sldId id="258" r:id="rId4"/>
+    <p:sldId id="259" r:id="rId5"/>
+    <p:sldId id="260" r:id="rId6"/>
   </p:sldIdLst>
   <p:sldSz cx="12192000" cy="27432000"/>
   <p:notesSz cx="6858000" cy="9144000"/>
@@ -105,7 +108,16 @@
       </a:defRPr>
     </a:lvl9pPr>
   </p:defaultTextStyle>
+  <p:extLst>
+    <p:ext uri="{EFAFB233-063F-42B5-8137-9DF3F51BA10A}">
+      <p15:sldGuideLst xmlns:p15="http://schemas.microsoft.com/office/powerpoint/2012/main"/>
+    </p:ext>
+  </p:extLst>
 </p:presentation>
+</file>
+
+<file path=ppt/revisionInfo.xml><?xml version="1.0" encoding="utf-8"?>
+<p1510:revInfo xmlns:a="http://schemas.openxmlformats.org/drawingml/2006/main" xmlns:r="http://schemas.openxmlformats.org/officeDocument/2006/relationships" xmlns:p1510="http://schemas.microsoft.com/office/powerpoint/2015/10/main"/>
 </file>
 
 <file path=ppt/slideLayouts/slideLayout1.xml><?xml version="1.0" encoding="utf-8"?>
@@ -239,7 +251,7 @@
           <a:p>
             <a:fld id="{8F9CA32A-87CD-4E02-8694-4944287C6CD9}" type="datetimeFigureOut">
               <a:rPr lang="en-US" smtClean="0"/>
-              <a:t>5/15/2017</a:t>
+              <a:t>5/16/2017</a:t>
             </a:fld>
             <a:endParaRPr lang="en-US"/>
           </a:p>
@@ -409,7 +421,7 @@
           <a:p>
             <a:fld id="{8F9CA32A-87CD-4E02-8694-4944287C6CD9}" type="datetimeFigureOut">
               <a:rPr lang="en-US" smtClean="0"/>
-              <a:t>5/15/2017</a:t>
+              <a:t>5/16/2017</a:t>
             </a:fld>
             <a:endParaRPr lang="en-US"/>
           </a:p>
@@ -589,7 +601,7 @@
           <a:p>
             <a:fld id="{8F9CA32A-87CD-4E02-8694-4944287C6CD9}" type="datetimeFigureOut">
               <a:rPr lang="en-US" smtClean="0"/>
-              <a:t>5/15/2017</a:t>
+              <a:t>5/16/2017</a:t>
             </a:fld>
             <a:endParaRPr lang="en-US"/>
           </a:p>
@@ -759,7 +771,7 @@
           <a:p>
             <a:fld id="{8F9CA32A-87CD-4E02-8694-4944287C6CD9}" type="datetimeFigureOut">
               <a:rPr lang="en-US" smtClean="0"/>
-              <a:t>5/15/2017</a:t>
+              <a:t>5/16/2017</a:t>
             </a:fld>
             <a:endParaRPr lang="en-US"/>
           </a:p>
@@ -1003,7 +1015,7 @@
           <a:p>
             <a:fld id="{8F9CA32A-87CD-4E02-8694-4944287C6CD9}" type="datetimeFigureOut">
               <a:rPr lang="en-US" smtClean="0"/>
-              <a:t>5/15/2017</a:t>
+              <a:t>5/16/2017</a:t>
             </a:fld>
             <a:endParaRPr lang="en-US"/>
           </a:p>
@@ -1235,7 +1247,7 @@
           <a:p>
             <a:fld id="{8F9CA32A-87CD-4E02-8694-4944287C6CD9}" type="datetimeFigureOut">
               <a:rPr lang="en-US" smtClean="0"/>
-              <a:t>5/15/2017</a:t>
+              <a:t>5/16/2017</a:t>
             </a:fld>
             <a:endParaRPr lang="en-US"/>
           </a:p>
@@ -1602,7 +1614,7 @@
           <a:p>
             <a:fld id="{8F9CA32A-87CD-4E02-8694-4944287C6CD9}" type="datetimeFigureOut">
               <a:rPr lang="en-US" smtClean="0"/>
-              <a:t>5/15/2017</a:t>
+              <a:t>5/16/2017</a:t>
             </a:fld>
             <a:endParaRPr lang="en-US"/>
           </a:p>
@@ -1720,7 +1732,7 @@
           <a:p>
             <a:fld id="{8F9CA32A-87CD-4E02-8694-4944287C6CD9}" type="datetimeFigureOut">
               <a:rPr lang="en-US" smtClean="0"/>
-              <a:t>5/15/2017</a:t>
+              <a:t>5/16/2017</a:t>
             </a:fld>
             <a:endParaRPr lang="en-US"/>
           </a:p>
@@ -1815,7 +1827,7 @@
           <a:p>
             <a:fld id="{8F9CA32A-87CD-4E02-8694-4944287C6CD9}" type="datetimeFigureOut">
               <a:rPr lang="en-US" smtClean="0"/>
-              <a:t>5/15/2017</a:t>
+              <a:t>5/16/2017</a:t>
             </a:fld>
             <a:endParaRPr lang="en-US"/>
           </a:p>
@@ -2092,7 +2104,7 @@
           <a:p>
             <a:fld id="{8F9CA32A-87CD-4E02-8694-4944287C6CD9}" type="datetimeFigureOut">
               <a:rPr lang="en-US" smtClean="0"/>
-              <a:t>5/15/2017</a:t>
+              <a:t>5/16/2017</a:t>
             </a:fld>
             <a:endParaRPr lang="en-US"/>
           </a:p>
@@ -2349,7 +2361,7 @@
           <a:p>
             <a:fld id="{8F9CA32A-87CD-4E02-8694-4944287C6CD9}" type="datetimeFigureOut">
               <a:rPr lang="en-US" smtClean="0"/>
-              <a:t>5/15/2017</a:t>
+              <a:t>5/16/2017</a:t>
             </a:fld>
             <a:endParaRPr lang="en-US"/>
           </a:p>
@@ -2562,7 +2574,7 @@
           <a:p>
             <a:fld id="{8F9CA32A-87CD-4E02-8694-4944287C6CD9}" type="datetimeFigureOut">
               <a:rPr lang="en-US" smtClean="0"/>
-              <a:t>5/15/2017</a:t>
+              <a:t>5/16/2017</a:t>
             </a:fld>
             <a:endParaRPr lang="en-US"/>
           </a:p>
@@ -2983,14 +2995,1350 @@
         </p:blipFill>
         <p:spPr>
           <a:xfrm>
-            <a:off x="574145" y="5575829"/>
-            <a:ext cx="9895390" cy="6345237"/>
+            <a:off x="421745" y="2438929"/>
+            <a:ext cx="5171178" cy="3315923"/>
           </a:xfrm>
           <a:prstGeom prst="rect">
             <a:avLst/>
           </a:prstGeom>
         </p:spPr>
       </p:pic>
+      <p:sp>
+        <p:nvSpPr>
+          <p:cNvPr id="2" name="Rectangle 1"/>
+          <p:cNvSpPr/>
+          <p:nvPr/>
+        </p:nvSpPr>
+        <p:spPr>
+          <a:xfrm>
+            <a:off x="1702069" y="6241534"/>
+            <a:ext cx="1815562" cy="369332"/>
+          </a:xfrm>
+          <a:prstGeom prst="rect">
+            <a:avLst/>
+          </a:prstGeom>
+        </p:spPr>
+        <p:txBody>
+          <a:bodyPr wrap="none">
+            <a:spAutoFit/>
+          </a:bodyPr>
+          <a:lstStyle/>
+          <a:p>
+            <a:r>
+              <a:rPr lang="en-US" dirty="0"/>
+              <a:t>state/school/club</a:t>
+            </a:r>
+          </a:p>
+        </p:txBody>
+      </p:sp>
+      <p:pic>
+        <p:nvPicPr>
+          <p:cNvPr id="3" name="Picture 2"/>
+          <p:cNvPicPr>
+            <a:picLocks noChangeAspect="1"/>
+          </p:cNvPicPr>
+          <p:nvPr/>
+        </p:nvPicPr>
+        <p:blipFill>
+          <a:blip r:embed="rId3"/>
+          <a:stretch>
+            <a:fillRect/>
+          </a:stretch>
+        </p:blipFill>
+        <p:spPr>
+          <a:xfrm>
+            <a:off x="3609975" y="6311900"/>
+            <a:ext cx="1809750" cy="228600"/>
+          </a:xfrm>
+          <a:prstGeom prst="rect">
+            <a:avLst/>
+          </a:prstGeom>
+        </p:spPr>
+      </p:pic>
+      <p:pic>
+        <p:nvPicPr>
+          <p:cNvPr id="5" name="Picture 4"/>
+          <p:cNvPicPr>
+            <a:picLocks noChangeAspect="1"/>
+          </p:cNvPicPr>
+          <p:nvPr/>
+        </p:nvPicPr>
+        <p:blipFill>
+          <a:blip r:embed="rId4"/>
+          <a:stretch>
+            <a:fillRect/>
+          </a:stretch>
+        </p:blipFill>
+        <p:spPr>
+          <a:xfrm>
+            <a:off x="5996545" y="1266447"/>
+            <a:ext cx="6024005" cy="6786987"/>
+          </a:xfrm>
+          <a:prstGeom prst="rect">
+            <a:avLst/>
+          </a:prstGeom>
+        </p:spPr>
+      </p:pic>
+      <p:pic>
+        <p:nvPicPr>
+          <p:cNvPr id="7" name="Picture 6"/>
+          <p:cNvPicPr>
+            <a:picLocks noChangeAspect="1"/>
+          </p:cNvPicPr>
+          <p:nvPr/>
+        </p:nvPicPr>
+        <p:blipFill>
+          <a:blip r:embed="rId5"/>
+          <a:stretch>
+            <a:fillRect/>
+          </a:stretch>
+        </p:blipFill>
+        <p:spPr>
+          <a:xfrm>
+            <a:off x="0" y="0"/>
+            <a:ext cx="12192000" cy="366882"/>
+          </a:xfrm>
+          <a:prstGeom prst="rect">
+            <a:avLst/>
+          </a:prstGeom>
+        </p:spPr>
+      </p:pic>
+      <p:sp>
+        <p:nvSpPr>
+          <p:cNvPr id="8" name="Rectangle 7"/>
+          <p:cNvSpPr/>
+          <p:nvPr/>
+        </p:nvSpPr>
+        <p:spPr>
+          <a:xfrm>
+            <a:off x="1947332" y="343117"/>
+            <a:ext cx="8297336" cy="923330"/>
+          </a:xfrm>
+          <a:prstGeom prst="rect">
+            <a:avLst/>
+          </a:prstGeom>
+          <a:noFill/>
+        </p:spPr>
+        <p:txBody>
+          <a:bodyPr wrap="square" lIns="91440" tIns="45720" rIns="91440" bIns="45720">
+            <a:spAutoFit/>
+          </a:bodyPr>
+          <a:lstStyle/>
+          <a:p>
+            <a:pPr algn="ctr"/>
+            <a:r>
+              <a:rPr lang="en-US" sz="5400" b="0" cap="none" spc="0" dirty="0">
+                <a:ln w="0"/>
+                <a:solidFill>
+                  <a:schemeClr val="tx1"/>
+                </a:solidFill>
+                <a:effectLst>
+                  <a:outerShdw blurRad="38100" dist="19050" dir="2700000" algn="tl" rotWithShape="0">
+                    <a:schemeClr val="dk1">
+                      <a:alpha val="40000"/>
+                    </a:schemeClr>
+                  </a:outerShdw>
+                </a:effectLst>
+              </a:rPr>
+              <a:t>CSC</a:t>
+            </a:r>
+          </a:p>
+        </p:txBody>
+      </p:sp>
+      <p:sp>
+        <p:nvSpPr>
+          <p:cNvPr id="9" name="Rectangle 8"/>
+          <p:cNvSpPr/>
+          <p:nvPr/>
+        </p:nvSpPr>
+        <p:spPr>
+          <a:xfrm>
+            <a:off x="171450" y="1370844"/>
+            <a:ext cx="11849100" cy="6534150"/>
+          </a:xfrm>
+          <a:prstGeom prst="rect">
+            <a:avLst/>
+          </a:prstGeom>
+          <a:noFill/>
+          <a:ln>
+            <a:solidFill>
+              <a:schemeClr val="tx1">
+                <a:lumMod val="95000"/>
+                <a:lumOff val="5000"/>
+              </a:schemeClr>
+            </a:solidFill>
+          </a:ln>
+        </p:spPr>
+        <p:style>
+          <a:lnRef idx="2">
+            <a:schemeClr val="accent1">
+              <a:shade val="50000"/>
+            </a:schemeClr>
+          </a:lnRef>
+          <a:fillRef idx="1">
+            <a:schemeClr val="accent1"/>
+          </a:fillRef>
+          <a:effectRef idx="0">
+            <a:schemeClr val="accent1"/>
+          </a:effectRef>
+          <a:fontRef idx="minor">
+            <a:schemeClr val="lt1"/>
+          </a:fontRef>
+        </p:style>
+        <p:txBody>
+          <a:bodyPr rtlCol="0" anchor="ctr"/>
+          <a:lstStyle/>
+          <a:p>
+            <a:pPr algn="ctr"/>
+            <a:endParaRPr lang="en-US"/>
+          </a:p>
+        </p:txBody>
+      </p:sp>
+      <p:cxnSp>
+        <p:nvCxnSpPr>
+          <p:cNvPr id="11" name="Straight Connector 10"/>
+          <p:cNvCxnSpPr>
+            <a:cxnSpLocks/>
+            <a:stCxn id="9" idx="0"/>
+            <a:endCxn id="9" idx="2"/>
+          </p:cNvCxnSpPr>
+          <p:nvPr/>
+        </p:nvCxnSpPr>
+        <p:spPr>
+          <a:xfrm>
+            <a:off x="6096000" y="1370844"/>
+            <a:ext cx="0" cy="6534150"/>
+          </a:xfrm>
+          <a:prstGeom prst="line">
+            <a:avLst/>
+          </a:prstGeom>
+        </p:spPr>
+        <p:style>
+          <a:lnRef idx="1">
+            <a:schemeClr val="accent1"/>
+          </a:lnRef>
+          <a:fillRef idx="0">
+            <a:schemeClr val="accent1"/>
+          </a:fillRef>
+          <a:effectRef idx="0">
+            <a:schemeClr val="accent1"/>
+          </a:effectRef>
+          <a:fontRef idx="minor">
+            <a:schemeClr val="tx1"/>
+          </a:fontRef>
+        </p:style>
+      </p:cxnSp>
+      <p:pic>
+        <p:nvPicPr>
+          <p:cNvPr id="1026" name="Picture 2" descr="Image result for MISSOURI"/>
+          <p:cNvPicPr>
+            <a:picLocks noChangeAspect="1" noChangeArrowheads="1"/>
+          </p:cNvPicPr>
+          <p:nvPr/>
+        </p:nvPicPr>
+        <p:blipFill>
+          <a:blip r:embed="rId6">
+            <a:extLst>
+              <a:ext uri="{28A0092B-C50C-407E-A947-70E740481C1C}">
+                <a14:useLocalDpi xmlns:a14="http://schemas.microsoft.com/office/drawing/2010/main" val="0"/>
+              </a:ext>
+            </a:extLst>
+          </a:blip>
+          <a:srcRect/>
+          <a:stretch>
+            <a:fillRect/>
+          </a:stretch>
+        </p:blipFill>
+        <p:spPr bwMode="auto">
+          <a:xfrm>
+            <a:off x="116157" y="8536932"/>
+            <a:ext cx="5908406" cy="5987114"/>
+          </a:xfrm>
+          <a:prstGeom prst="rect">
+            <a:avLst/>
+          </a:prstGeom>
+          <a:noFill/>
+          <a:extLst>
+            <a:ext uri="{909E8E84-426E-40DD-AFC4-6F175D3DCCD1}">
+              <a14:hiddenFill xmlns:a14="http://schemas.microsoft.com/office/drawing/2010/main">
+                <a:solidFill>
+                  <a:srgbClr val="FFFFFF"/>
+                </a:solidFill>
+              </a14:hiddenFill>
+            </a:ext>
+          </a:extLst>
+        </p:spPr>
+      </p:pic>
+      <p:sp>
+        <p:nvSpPr>
+          <p:cNvPr id="14" name="Rectangle 13"/>
+          <p:cNvSpPr/>
+          <p:nvPr/>
+        </p:nvSpPr>
+        <p:spPr>
+          <a:xfrm>
+            <a:off x="1611204" y="13603794"/>
+            <a:ext cx="1815562" cy="369332"/>
+          </a:xfrm>
+          <a:prstGeom prst="rect">
+            <a:avLst/>
+          </a:prstGeom>
+        </p:spPr>
+        <p:txBody>
+          <a:bodyPr wrap="none">
+            <a:spAutoFit/>
+          </a:bodyPr>
+          <a:lstStyle/>
+          <a:p>
+            <a:r>
+              <a:rPr lang="en-US" dirty="0"/>
+              <a:t>state/school/club</a:t>
+            </a:r>
+          </a:p>
+        </p:txBody>
+      </p:sp>
+      <p:pic>
+        <p:nvPicPr>
+          <p:cNvPr id="15" name="Picture 14"/>
+          <p:cNvPicPr>
+            <a:picLocks noChangeAspect="1"/>
+          </p:cNvPicPr>
+          <p:nvPr/>
+        </p:nvPicPr>
+        <p:blipFill>
+          <a:blip r:embed="rId3"/>
+          <a:stretch>
+            <a:fillRect/>
+          </a:stretch>
+        </p:blipFill>
+        <p:spPr>
+          <a:xfrm>
+            <a:off x="3647642" y="13679562"/>
+            <a:ext cx="1809750" cy="228600"/>
+          </a:xfrm>
+          <a:prstGeom prst="rect">
+            <a:avLst/>
+          </a:prstGeom>
+        </p:spPr>
+      </p:pic>
+      <p:pic>
+        <p:nvPicPr>
+          <p:cNvPr id="16" name="Picture 15"/>
+          <p:cNvPicPr>
+            <a:picLocks noChangeAspect="1"/>
+          </p:cNvPicPr>
+          <p:nvPr/>
+        </p:nvPicPr>
+        <p:blipFill>
+          <a:blip r:embed="rId4"/>
+          <a:stretch>
+            <a:fillRect/>
+          </a:stretch>
+        </p:blipFill>
+        <p:spPr>
+          <a:xfrm>
+            <a:off x="6158926" y="8378258"/>
+            <a:ext cx="5884032" cy="6629286"/>
+          </a:xfrm>
+          <a:prstGeom prst="rect">
+            <a:avLst/>
+          </a:prstGeom>
+        </p:spPr>
+      </p:pic>
+      <p:sp>
+        <p:nvSpPr>
+          <p:cNvPr id="17" name="Rectangle 16"/>
+          <p:cNvSpPr/>
+          <p:nvPr/>
+        </p:nvSpPr>
+        <p:spPr>
+          <a:xfrm>
+            <a:off x="171450" y="8473394"/>
+            <a:ext cx="11849100" cy="6534150"/>
+          </a:xfrm>
+          <a:prstGeom prst="rect">
+            <a:avLst/>
+          </a:prstGeom>
+          <a:noFill/>
+          <a:ln>
+            <a:solidFill>
+              <a:schemeClr val="tx1">
+                <a:lumMod val="95000"/>
+                <a:lumOff val="5000"/>
+              </a:schemeClr>
+            </a:solidFill>
+          </a:ln>
+        </p:spPr>
+        <p:style>
+          <a:lnRef idx="2">
+            <a:schemeClr val="accent1">
+              <a:shade val="50000"/>
+            </a:schemeClr>
+          </a:lnRef>
+          <a:fillRef idx="1">
+            <a:schemeClr val="accent1"/>
+          </a:fillRef>
+          <a:effectRef idx="0">
+            <a:schemeClr val="accent1"/>
+          </a:effectRef>
+          <a:fontRef idx="minor">
+            <a:schemeClr val="lt1"/>
+          </a:fontRef>
+        </p:style>
+        <p:txBody>
+          <a:bodyPr rtlCol="0" anchor="ctr"/>
+          <a:lstStyle/>
+          <a:p>
+            <a:pPr algn="ctr"/>
+            <a:endParaRPr lang="en-US"/>
+          </a:p>
+        </p:txBody>
+      </p:sp>
+      <p:cxnSp>
+        <p:nvCxnSpPr>
+          <p:cNvPr id="18" name="Straight Connector 17"/>
+          <p:cNvCxnSpPr>
+            <a:cxnSpLocks/>
+            <a:stCxn id="17" idx="0"/>
+            <a:endCxn id="17" idx="2"/>
+          </p:cNvCxnSpPr>
+          <p:nvPr/>
+        </p:nvCxnSpPr>
+        <p:spPr>
+          <a:xfrm>
+            <a:off x="6096000" y="8473394"/>
+            <a:ext cx="0" cy="6534150"/>
+          </a:xfrm>
+          <a:prstGeom prst="line">
+            <a:avLst/>
+          </a:prstGeom>
+        </p:spPr>
+        <p:style>
+          <a:lnRef idx="1">
+            <a:schemeClr val="accent1"/>
+          </a:lnRef>
+          <a:fillRef idx="0">
+            <a:schemeClr val="accent1"/>
+          </a:fillRef>
+          <a:effectRef idx="0">
+            <a:schemeClr val="accent1"/>
+          </a:effectRef>
+          <a:fontRef idx="minor">
+            <a:schemeClr val="tx1"/>
+          </a:fontRef>
+        </p:style>
+      </p:cxnSp>
+      <p:sp>
+        <p:nvSpPr>
+          <p:cNvPr id="13" name="Flowchart: Connector 12"/>
+          <p:cNvSpPr/>
+          <p:nvPr/>
+        </p:nvSpPr>
+        <p:spPr>
+          <a:xfrm>
+            <a:off x="1702069" y="10726057"/>
+            <a:ext cx="136256" cy="119743"/>
+          </a:xfrm>
+          <a:prstGeom prst="flowChartConnector">
+            <a:avLst/>
+          </a:prstGeom>
+        </p:spPr>
+        <p:style>
+          <a:lnRef idx="2">
+            <a:schemeClr val="accent2">
+              <a:shade val="50000"/>
+            </a:schemeClr>
+          </a:lnRef>
+          <a:fillRef idx="1">
+            <a:schemeClr val="accent2"/>
+          </a:fillRef>
+          <a:effectRef idx="0">
+            <a:schemeClr val="accent2"/>
+          </a:effectRef>
+          <a:fontRef idx="minor">
+            <a:schemeClr val="lt1"/>
+          </a:fontRef>
+        </p:style>
+        <p:txBody>
+          <a:bodyPr rtlCol="0" anchor="ctr"/>
+          <a:lstStyle/>
+          <a:p>
+            <a:pPr algn="ctr"/>
+            <a:endParaRPr lang="en-US"/>
+          </a:p>
+        </p:txBody>
+      </p:sp>
+      <p:sp>
+        <p:nvSpPr>
+          <p:cNvPr id="20" name="Flowchart: Connector 19"/>
+          <p:cNvSpPr/>
+          <p:nvPr/>
+        </p:nvSpPr>
+        <p:spPr>
+          <a:xfrm>
+            <a:off x="2609850" y="9919786"/>
+            <a:ext cx="136256" cy="119743"/>
+          </a:xfrm>
+          <a:prstGeom prst="flowChartConnector">
+            <a:avLst/>
+          </a:prstGeom>
+        </p:spPr>
+        <p:style>
+          <a:lnRef idx="2">
+            <a:schemeClr val="accent2">
+              <a:shade val="50000"/>
+            </a:schemeClr>
+          </a:lnRef>
+          <a:fillRef idx="1">
+            <a:schemeClr val="accent2"/>
+          </a:fillRef>
+          <a:effectRef idx="0">
+            <a:schemeClr val="accent2"/>
+          </a:effectRef>
+          <a:fontRef idx="minor">
+            <a:schemeClr val="lt1"/>
+          </a:fontRef>
+        </p:style>
+        <p:txBody>
+          <a:bodyPr rtlCol="0" anchor="ctr"/>
+          <a:lstStyle/>
+          <a:p>
+            <a:pPr algn="ctr"/>
+            <a:endParaRPr lang="en-US"/>
+          </a:p>
+        </p:txBody>
+      </p:sp>
+      <p:sp>
+        <p:nvSpPr>
+          <p:cNvPr id="21" name="Flowchart: Connector 20"/>
+          <p:cNvSpPr/>
+          <p:nvPr/>
+        </p:nvSpPr>
+        <p:spPr>
+          <a:xfrm>
+            <a:off x="1633941" y="10262243"/>
+            <a:ext cx="136256" cy="119743"/>
+          </a:xfrm>
+          <a:prstGeom prst="flowChartConnector">
+            <a:avLst/>
+          </a:prstGeom>
+        </p:spPr>
+        <p:style>
+          <a:lnRef idx="2">
+            <a:schemeClr val="accent2">
+              <a:shade val="50000"/>
+            </a:schemeClr>
+          </a:lnRef>
+          <a:fillRef idx="1">
+            <a:schemeClr val="accent2"/>
+          </a:fillRef>
+          <a:effectRef idx="0">
+            <a:schemeClr val="accent2"/>
+          </a:effectRef>
+          <a:fontRef idx="minor">
+            <a:schemeClr val="lt1"/>
+          </a:fontRef>
+        </p:style>
+        <p:txBody>
+          <a:bodyPr rtlCol="0" anchor="ctr"/>
+          <a:lstStyle/>
+          <a:p>
+            <a:pPr algn="ctr"/>
+            <a:endParaRPr lang="en-US"/>
+          </a:p>
+        </p:txBody>
+      </p:sp>
+      <p:sp>
+        <p:nvSpPr>
+          <p:cNvPr id="22" name="Flowchart: Connector 21"/>
+          <p:cNvSpPr/>
+          <p:nvPr/>
+        </p:nvSpPr>
+        <p:spPr>
+          <a:xfrm>
+            <a:off x="1866369" y="12407220"/>
+            <a:ext cx="136256" cy="119743"/>
+          </a:xfrm>
+          <a:prstGeom prst="flowChartConnector">
+            <a:avLst/>
+          </a:prstGeom>
+        </p:spPr>
+        <p:style>
+          <a:lnRef idx="2">
+            <a:schemeClr val="accent2">
+              <a:shade val="50000"/>
+            </a:schemeClr>
+          </a:lnRef>
+          <a:fillRef idx="1">
+            <a:schemeClr val="accent2"/>
+          </a:fillRef>
+          <a:effectRef idx="0">
+            <a:schemeClr val="accent2"/>
+          </a:effectRef>
+          <a:fontRef idx="minor">
+            <a:schemeClr val="lt1"/>
+          </a:fontRef>
+        </p:style>
+        <p:txBody>
+          <a:bodyPr rtlCol="0" anchor="ctr"/>
+          <a:lstStyle/>
+          <a:p>
+            <a:pPr algn="ctr"/>
+            <a:endParaRPr lang="en-US"/>
+          </a:p>
+        </p:txBody>
+      </p:sp>
+      <p:sp>
+        <p:nvSpPr>
+          <p:cNvPr id="23" name="Flowchart: Connector 22"/>
+          <p:cNvSpPr/>
+          <p:nvPr/>
+        </p:nvSpPr>
+        <p:spPr>
+          <a:xfrm>
+            <a:off x="2536429" y="12537813"/>
+            <a:ext cx="136256" cy="119743"/>
+          </a:xfrm>
+          <a:prstGeom prst="flowChartConnector">
+            <a:avLst/>
+          </a:prstGeom>
+        </p:spPr>
+        <p:style>
+          <a:lnRef idx="2">
+            <a:schemeClr val="accent2">
+              <a:shade val="50000"/>
+            </a:schemeClr>
+          </a:lnRef>
+          <a:fillRef idx="1">
+            <a:schemeClr val="accent2"/>
+          </a:fillRef>
+          <a:effectRef idx="0">
+            <a:schemeClr val="accent2"/>
+          </a:effectRef>
+          <a:fontRef idx="minor">
+            <a:schemeClr val="lt1"/>
+          </a:fontRef>
+        </p:style>
+        <p:txBody>
+          <a:bodyPr rtlCol="0" anchor="ctr"/>
+          <a:lstStyle/>
+          <a:p>
+            <a:pPr algn="ctr"/>
+            <a:endParaRPr lang="en-US"/>
+          </a:p>
+        </p:txBody>
+      </p:sp>
+      <p:sp>
+        <p:nvSpPr>
+          <p:cNvPr id="24" name="Flowchart: Connector 23"/>
+          <p:cNvSpPr/>
+          <p:nvPr/>
+        </p:nvSpPr>
+        <p:spPr>
+          <a:xfrm>
+            <a:off x="1798241" y="11943406"/>
+            <a:ext cx="136256" cy="119743"/>
+          </a:xfrm>
+          <a:prstGeom prst="flowChartConnector">
+            <a:avLst/>
+          </a:prstGeom>
+        </p:spPr>
+        <p:style>
+          <a:lnRef idx="2">
+            <a:schemeClr val="accent2">
+              <a:shade val="50000"/>
+            </a:schemeClr>
+          </a:lnRef>
+          <a:fillRef idx="1">
+            <a:schemeClr val="accent2"/>
+          </a:fillRef>
+          <a:effectRef idx="0">
+            <a:schemeClr val="accent2"/>
+          </a:effectRef>
+          <a:fontRef idx="minor">
+            <a:schemeClr val="lt1"/>
+          </a:fontRef>
+        </p:style>
+        <p:txBody>
+          <a:bodyPr rtlCol="0" anchor="ctr"/>
+          <a:lstStyle/>
+          <a:p>
+            <a:pPr algn="ctr"/>
+            <a:endParaRPr lang="en-US"/>
+          </a:p>
+        </p:txBody>
+      </p:sp>
+      <p:sp>
+        <p:nvSpPr>
+          <p:cNvPr id="25" name="Flowchart: Connector 24"/>
+          <p:cNvSpPr/>
+          <p:nvPr/>
+        </p:nvSpPr>
+        <p:spPr>
+          <a:xfrm>
+            <a:off x="4147866" y="12306705"/>
+            <a:ext cx="136256" cy="119743"/>
+          </a:xfrm>
+          <a:prstGeom prst="flowChartConnector">
+            <a:avLst/>
+          </a:prstGeom>
+        </p:spPr>
+        <p:style>
+          <a:lnRef idx="2">
+            <a:schemeClr val="accent2">
+              <a:shade val="50000"/>
+            </a:schemeClr>
+          </a:lnRef>
+          <a:fillRef idx="1">
+            <a:schemeClr val="accent2"/>
+          </a:fillRef>
+          <a:effectRef idx="0">
+            <a:schemeClr val="accent2"/>
+          </a:effectRef>
+          <a:fontRef idx="minor">
+            <a:schemeClr val="lt1"/>
+          </a:fontRef>
+        </p:style>
+        <p:txBody>
+          <a:bodyPr rtlCol="0" anchor="ctr"/>
+          <a:lstStyle/>
+          <a:p>
+            <a:pPr algn="ctr"/>
+            <a:endParaRPr lang="en-US"/>
+          </a:p>
+        </p:txBody>
+      </p:sp>
+      <p:sp>
+        <p:nvSpPr>
+          <p:cNvPr id="26" name="Flowchart: Connector 25"/>
+          <p:cNvSpPr/>
+          <p:nvPr/>
+        </p:nvSpPr>
+        <p:spPr>
+          <a:xfrm>
+            <a:off x="3723818" y="11189744"/>
+            <a:ext cx="136256" cy="119743"/>
+          </a:xfrm>
+          <a:prstGeom prst="flowChartConnector">
+            <a:avLst/>
+          </a:prstGeom>
+        </p:spPr>
+        <p:style>
+          <a:lnRef idx="2">
+            <a:schemeClr val="accent2">
+              <a:shade val="50000"/>
+            </a:schemeClr>
+          </a:lnRef>
+          <a:fillRef idx="1">
+            <a:schemeClr val="accent2"/>
+          </a:fillRef>
+          <a:effectRef idx="0">
+            <a:schemeClr val="accent2"/>
+          </a:effectRef>
+          <a:fontRef idx="minor">
+            <a:schemeClr val="lt1"/>
+          </a:fontRef>
+        </p:style>
+        <p:txBody>
+          <a:bodyPr rtlCol="0" anchor="ctr"/>
+          <a:lstStyle/>
+          <a:p>
+            <a:pPr algn="ctr"/>
+            <a:endParaRPr lang="en-US"/>
+          </a:p>
+        </p:txBody>
+      </p:sp>
+      <p:sp>
+        <p:nvSpPr>
+          <p:cNvPr id="27" name="Flowchart: Connector 26"/>
+          <p:cNvSpPr/>
+          <p:nvPr/>
+        </p:nvSpPr>
+        <p:spPr>
+          <a:xfrm>
+            <a:off x="3124563" y="10677525"/>
+            <a:ext cx="94887" cy="108403"/>
+          </a:xfrm>
+          <a:prstGeom prst="flowChartConnector">
+            <a:avLst/>
+          </a:prstGeom>
+        </p:spPr>
+        <p:style>
+          <a:lnRef idx="2">
+            <a:schemeClr val="accent2">
+              <a:shade val="50000"/>
+            </a:schemeClr>
+          </a:lnRef>
+          <a:fillRef idx="1">
+            <a:schemeClr val="accent2"/>
+          </a:fillRef>
+          <a:effectRef idx="0">
+            <a:schemeClr val="accent2"/>
+          </a:effectRef>
+          <a:fontRef idx="minor">
+            <a:schemeClr val="lt1"/>
+          </a:fontRef>
+        </p:style>
+        <p:txBody>
+          <a:bodyPr rtlCol="0" anchor="ctr"/>
+          <a:lstStyle/>
+          <a:p>
+            <a:pPr algn="ctr"/>
+            <a:endParaRPr lang="en-US"/>
+          </a:p>
+        </p:txBody>
+      </p:sp>
+      <p:sp>
+        <p:nvSpPr>
+          <p:cNvPr id="42" name="Flowchart: Connector 41"/>
+          <p:cNvSpPr/>
+          <p:nvPr/>
+        </p:nvSpPr>
+        <p:spPr>
+          <a:xfrm>
+            <a:off x="2447394" y="11070001"/>
+            <a:ext cx="136256" cy="119743"/>
+          </a:xfrm>
+          <a:prstGeom prst="flowChartConnector">
+            <a:avLst/>
+          </a:prstGeom>
+        </p:spPr>
+        <p:style>
+          <a:lnRef idx="2">
+            <a:schemeClr val="accent2">
+              <a:shade val="50000"/>
+            </a:schemeClr>
+          </a:lnRef>
+          <a:fillRef idx="1">
+            <a:schemeClr val="accent2"/>
+          </a:fillRef>
+          <a:effectRef idx="0">
+            <a:schemeClr val="accent2"/>
+          </a:effectRef>
+          <a:fontRef idx="minor">
+            <a:schemeClr val="lt1"/>
+          </a:fontRef>
+        </p:style>
+        <p:txBody>
+          <a:bodyPr rtlCol="0" anchor="ctr"/>
+          <a:lstStyle/>
+          <a:p>
+            <a:pPr algn="ctr"/>
+            <a:endParaRPr lang="en-US"/>
+          </a:p>
+        </p:txBody>
+      </p:sp>
+      <p:sp>
+        <p:nvSpPr>
+          <p:cNvPr id="43" name="Flowchart: Connector 42"/>
+          <p:cNvSpPr/>
+          <p:nvPr/>
+        </p:nvSpPr>
+        <p:spPr>
+          <a:xfrm>
+            <a:off x="2956059" y="11903957"/>
+            <a:ext cx="136256" cy="119743"/>
+          </a:xfrm>
+          <a:prstGeom prst="flowChartConnector">
+            <a:avLst/>
+          </a:prstGeom>
+        </p:spPr>
+        <p:style>
+          <a:lnRef idx="2">
+            <a:schemeClr val="accent2">
+              <a:shade val="50000"/>
+            </a:schemeClr>
+          </a:lnRef>
+          <a:fillRef idx="1">
+            <a:schemeClr val="accent2"/>
+          </a:fillRef>
+          <a:effectRef idx="0">
+            <a:schemeClr val="accent2"/>
+          </a:effectRef>
+          <a:fontRef idx="minor">
+            <a:schemeClr val="lt1"/>
+          </a:fontRef>
+        </p:style>
+        <p:txBody>
+          <a:bodyPr rtlCol="0" anchor="ctr"/>
+          <a:lstStyle/>
+          <a:p>
+            <a:pPr algn="ctr"/>
+            <a:endParaRPr lang="en-US"/>
+          </a:p>
+        </p:txBody>
+      </p:sp>
+      <p:sp>
+        <p:nvSpPr>
+          <p:cNvPr id="44" name="Flowchart: Connector 43"/>
+          <p:cNvSpPr/>
+          <p:nvPr/>
+        </p:nvSpPr>
+        <p:spPr>
+          <a:xfrm>
+            <a:off x="3313247" y="11683699"/>
+            <a:ext cx="136256" cy="119743"/>
+          </a:xfrm>
+          <a:prstGeom prst="flowChartConnector">
+            <a:avLst/>
+          </a:prstGeom>
+        </p:spPr>
+        <p:style>
+          <a:lnRef idx="2">
+            <a:schemeClr val="accent2">
+              <a:shade val="50000"/>
+            </a:schemeClr>
+          </a:lnRef>
+          <a:fillRef idx="1">
+            <a:schemeClr val="accent2"/>
+          </a:fillRef>
+          <a:effectRef idx="0">
+            <a:schemeClr val="accent2"/>
+          </a:effectRef>
+          <a:fontRef idx="minor">
+            <a:schemeClr val="lt1"/>
+          </a:fontRef>
+        </p:style>
+        <p:txBody>
+          <a:bodyPr rtlCol="0" anchor="ctr"/>
+          <a:lstStyle/>
+          <a:p>
+            <a:pPr algn="ctr"/>
+            <a:endParaRPr lang="en-US"/>
+          </a:p>
+        </p:txBody>
+      </p:sp>
+      <p:pic>
+        <p:nvPicPr>
+          <p:cNvPr id="19" name="Picture 18"/>
+          <p:cNvPicPr>
+            <a:picLocks noChangeAspect="1"/>
+          </p:cNvPicPr>
+          <p:nvPr/>
+        </p:nvPicPr>
+        <p:blipFill>
+          <a:blip r:embed="rId7"/>
+          <a:stretch>
+            <a:fillRect/>
+          </a:stretch>
+        </p:blipFill>
+        <p:spPr>
+          <a:xfrm>
+            <a:off x="4552517" y="8538617"/>
+            <a:ext cx="686233" cy="504897"/>
+          </a:xfrm>
+          <a:prstGeom prst="rect">
+            <a:avLst/>
+          </a:prstGeom>
+        </p:spPr>
+      </p:pic>
+      <p:pic>
+        <p:nvPicPr>
+          <p:cNvPr id="48" name="Picture 47"/>
+          <p:cNvPicPr>
+            <a:picLocks noChangeAspect="1"/>
+          </p:cNvPicPr>
+          <p:nvPr/>
+        </p:nvPicPr>
+        <p:blipFill>
+          <a:blip r:embed="rId8"/>
+          <a:stretch>
+            <a:fillRect/>
+          </a:stretch>
+        </p:blipFill>
+        <p:spPr>
+          <a:xfrm>
+            <a:off x="4126108" y="9107017"/>
+            <a:ext cx="1692153" cy="743049"/>
+          </a:xfrm>
+          <a:prstGeom prst="rect">
+            <a:avLst/>
+          </a:prstGeom>
+        </p:spPr>
+      </p:pic>
+      <p:sp>
+        <p:nvSpPr>
+          <p:cNvPr id="49" name="Rectangle 48"/>
+          <p:cNvSpPr/>
+          <p:nvPr/>
+        </p:nvSpPr>
+        <p:spPr>
+          <a:xfrm>
+            <a:off x="4029076" y="8473393"/>
+            <a:ext cx="1924050" cy="1536563"/>
+          </a:xfrm>
+          <a:prstGeom prst="rect">
+            <a:avLst/>
+          </a:prstGeom>
+          <a:noFill/>
+          <a:ln>
+            <a:solidFill>
+              <a:srgbClr val="FF0000"/>
+            </a:solidFill>
+          </a:ln>
+        </p:spPr>
+        <p:style>
+          <a:lnRef idx="2">
+            <a:schemeClr val="accent1">
+              <a:shade val="50000"/>
+            </a:schemeClr>
+          </a:lnRef>
+          <a:fillRef idx="1">
+            <a:schemeClr val="accent1"/>
+          </a:fillRef>
+          <a:effectRef idx="0">
+            <a:schemeClr val="accent1"/>
+          </a:effectRef>
+          <a:fontRef idx="minor">
+            <a:schemeClr val="lt1"/>
+          </a:fontRef>
+        </p:style>
+        <p:txBody>
+          <a:bodyPr rtlCol="0" anchor="ctr"/>
+          <a:lstStyle/>
+          <a:p>
+            <a:pPr algn="ctr"/>
+            <a:endParaRPr lang="en-US"/>
+          </a:p>
+        </p:txBody>
+      </p:sp>
+      <p:pic>
+        <p:nvPicPr>
+          <p:cNvPr id="50" name="Picture 49"/>
+          <p:cNvPicPr>
+            <a:picLocks noChangeAspect="1"/>
+          </p:cNvPicPr>
+          <p:nvPr/>
+        </p:nvPicPr>
+        <p:blipFill>
+          <a:blip r:embed="rId9"/>
+          <a:stretch>
+            <a:fillRect/>
+          </a:stretch>
+        </p:blipFill>
+        <p:spPr>
+          <a:xfrm>
+            <a:off x="3124563" y="10815764"/>
+            <a:ext cx="292678" cy="393785"/>
+          </a:xfrm>
+          <a:prstGeom prst="rect">
+            <a:avLst/>
+          </a:prstGeom>
+        </p:spPr>
+      </p:pic>
+      <p:pic>
+        <p:nvPicPr>
+          <p:cNvPr id="55" name="Picture 54"/>
+          <p:cNvPicPr>
+            <a:picLocks noChangeAspect="1"/>
+          </p:cNvPicPr>
+          <p:nvPr/>
+        </p:nvPicPr>
+        <p:blipFill>
+          <a:blip r:embed="rId4"/>
+          <a:stretch>
+            <a:fillRect/>
+          </a:stretch>
+        </p:blipFill>
+        <p:spPr>
+          <a:xfrm>
+            <a:off x="6150197" y="15427504"/>
+            <a:ext cx="5870354" cy="6613875"/>
+          </a:xfrm>
+          <a:prstGeom prst="rect">
+            <a:avLst/>
+          </a:prstGeom>
+        </p:spPr>
+      </p:pic>
+      <p:sp>
+        <p:nvSpPr>
+          <p:cNvPr id="56" name="Rectangle 55"/>
+          <p:cNvSpPr/>
+          <p:nvPr/>
+        </p:nvSpPr>
+        <p:spPr>
+          <a:xfrm>
+            <a:off x="157189" y="15507229"/>
+            <a:ext cx="11849100" cy="6534150"/>
+          </a:xfrm>
+          <a:prstGeom prst="rect">
+            <a:avLst/>
+          </a:prstGeom>
+          <a:noFill/>
+          <a:ln>
+            <a:solidFill>
+              <a:schemeClr val="tx1">
+                <a:lumMod val="95000"/>
+                <a:lumOff val="5000"/>
+              </a:schemeClr>
+            </a:solidFill>
+          </a:ln>
+        </p:spPr>
+        <p:style>
+          <a:lnRef idx="2">
+            <a:schemeClr val="accent1">
+              <a:shade val="50000"/>
+            </a:schemeClr>
+          </a:lnRef>
+          <a:fillRef idx="1">
+            <a:schemeClr val="accent1"/>
+          </a:fillRef>
+          <a:effectRef idx="0">
+            <a:schemeClr val="accent1"/>
+          </a:effectRef>
+          <a:fontRef idx="minor">
+            <a:schemeClr val="lt1"/>
+          </a:fontRef>
+        </p:style>
+        <p:txBody>
+          <a:bodyPr rtlCol="0" anchor="ctr"/>
+          <a:lstStyle/>
+          <a:p>
+            <a:pPr algn="ctr"/>
+            <a:endParaRPr lang="en-US"/>
+          </a:p>
+        </p:txBody>
+      </p:sp>
+      <p:cxnSp>
+        <p:nvCxnSpPr>
+          <p:cNvPr id="57" name="Straight Connector 56"/>
+          <p:cNvCxnSpPr>
+            <a:cxnSpLocks/>
+            <a:stCxn id="56" idx="0"/>
+            <a:endCxn id="56" idx="2"/>
+          </p:cNvCxnSpPr>
+          <p:nvPr/>
+        </p:nvCxnSpPr>
+        <p:spPr>
+          <a:xfrm>
+            <a:off x="6081739" y="15507229"/>
+            <a:ext cx="0" cy="6534150"/>
+          </a:xfrm>
+          <a:prstGeom prst="line">
+            <a:avLst/>
+          </a:prstGeom>
+        </p:spPr>
+        <p:style>
+          <a:lnRef idx="1">
+            <a:schemeClr val="accent1"/>
+          </a:lnRef>
+          <a:fillRef idx="0">
+            <a:schemeClr val="accent1"/>
+          </a:fillRef>
+          <a:effectRef idx="0">
+            <a:schemeClr val="accent1"/>
+          </a:effectRef>
+          <a:fontRef idx="minor">
+            <a:schemeClr val="tx1"/>
+          </a:fontRef>
+        </p:style>
+      </p:cxnSp>
+      <p:pic>
+        <p:nvPicPr>
+          <p:cNvPr id="58" name="Picture 57"/>
+          <p:cNvPicPr>
+            <a:picLocks noChangeAspect="1"/>
+          </p:cNvPicPr>
+          <p:nvPr/>
+        </p:nvPicPr>
+        <p:blipFill>
+          <a:blip r:embed="rId7"/>
+          <a:stretch>
+            <a:fillRect/>
+          </a:stretch>
+        </p:blipFill>
+        <p:spPr>
+          <a:xfrm>
+            <a:off x="2096391" y="15641167"/>
+            <a:ext cx="2119603" cy="1559501"/>
+          </a:xfrm>
+          <a:prstGeom prst="rect">
+            <a:avLst/>
+          </a:prstGeom>
+        </p:spPr>
+      </p:pic>
+      <p:pic>
+        <p:nvPicPr>
+          <p:cNvPr id="59" name="Picture 58"/>
+          <p:cNvPicPr>
+            <a:picLocks noChangeAspect="1"/>
+          </p:cNvPicPr>
+          <p:nvPr/>
+        </p:nvPicPr>
+        <p:blipFill>
+          <a:blip r:embed="rId8"/>
+          <a:stretch>
+            <a:fillRect/>
+          </a:stretch>
+        </p:blipFill>
+        <p:spPr>
+          <a:xfrm>
+            <a:off x="2031665" y="17311439"/>
+            <a:ext cx="2226055" cy="977493"/>
+          </a:xfrm>
+          <a:prstGeom prst="rect">
+            <a:avLst/>
+          </a:prstGeom>
+        </p:spPr>
+      </p:pic>
+      <p:pic>
+        <p:nvPicPr>
+          <p:cNvPr id="51" name="Picture 50"/>
+          <p:cNvPicPr>
+            <a:picLocks noChangeAspect="1"/>
+          </p:cNvPicPr>
+          <p:nvPr/>
+        </p:nvPicPr>
+        <p:blipFill>
+          <a:blip r:embed="rId10"/>
+          <a:stretch>
+            <a:fillRect/>
+          </a:stretch>
+        </p:blipFill>
+        <p:spPr>
+          <a:xfrm>
+            <a:off x="2031665" y="18579478"/>
+            <a:ext cx="1821809" cy="3194522"/>
+          </a:xfrm>
+          <a:prstGeom prst="rect">
+            <a:avLst/>
+          </a:prstGeom>
+        </p:spPr>
+      </p:pic>
+      <p:sp>
+        <p:nvSpPr>
+          <p:cNvPr id="60" name="TextBox 59"/>
+          <p:cNvSpPr txBox="1"/>
+          <p:nvPr/>
+        </p:nvSpPr>
+        <p:spPr>
+          <a:xfrm>
+            <a:off x="2687948" y="18249539"/>
+            <a:ext cx="1438160" cy="369332"/>
+          </a:xfrm>
+          <a:prstGeom prst="rect">
+            <a:avLst/>
+          </a:prstGeom>
+          <a:noFill/>
+        </p:spPr>
+        <p:txBody>
+          <a:bodyPr wrap="square" rtlCol="0">
+            <a:spAutoFit/>
+          </a:bodyPr>
+          <a:lstStyle/>
+          <a:p>
+            <a:r>
+              <a:rPr lang="en-US" dirty="0"/>
+              <a:t>CLUBS </a:t>
+            </a:r>
+            <a:r>
+              <a:rPr lang="en-US" sz="800" dirty="0"/>
+              <a:t>(LINKS)</a:t>
+            </a:r>
+          </a:p>
+        </p:txBody>
+      </p:sp>
+      <p:sp>
+        <p:nvSpPr>
+          <p:cNvPr id="61" name="Rectangle 60"/>
+          <p:cNvSpPr/>
+          <p:nvPr/>
+        </p:nvSpPr>
+        <p:spPr>
+          <a:xfrm>
+            <a:off x="1934497" y="18288932"/>
+            <a:ext cx="2466053" cy="3643968"/>
+          </a:xfrm>
+          <a:prstGeom prst="rect">
+            <a:avLst/>
+          </a:prstGeom>
+          <a:noFill/>
+        </p:spPr>
+        <p:style>
+          <a:lnRef idx="2">
+            <a:schemeClr val="accent1">
+              <a:shade val="50000"/>
+            </a:schemeClr>
+          </a:lnRef>
+          <a:fillRef idx="1">
+            <a:schemeClr val="accent1"/>
+          </a:fillRef>
+          <a:effectRef idx="0">
+            <a:schemeClr val="accent1"/>
+          </a:effectRef>
+          <a:fontRef idx="minor">
+            <a:schemeClr val="lt1"/>
+          </a:fontRef>
+        </p:style>
+        <p:txBody>
+          <a:bodyPr rtlCol="0" anchor="ctr"/>
+          <a:lstStyle/>
+          <a:p>
+            <a:pPr algn="ctr"/>
+            <a:endParaRPr lang="en-US"/>
+          </a:p>
+        </p:txBody>
+      </p:sp>
+      <p:cxnSp>
+        <p:nvCxnSpPr>
+          <p:cNvPr id="63" name="Straight Connector 62"/>
+          <p:cNvCxnSpPr/>
+          <p:nvPr/>
+        </p:nvCxnSpPr>
+        <p:spPr>
+          <a:xfrm>
+            <a:off x="60260" y="8227605"/>
+            <a:ext cx="12042958" cy="0"/>
+          </a:xfrm>
+          <a:prstGeom prst="line">
+            <a:avLst/>
+          </a:prstGeom>
+        </p:spPr>
+        <p:style>
+          <a:lnRef idx="1">
+            <a:schemeClr val="dk1"/>
+          </a:lnRef>
+          <a:fillRef idx="0">
+            <a:schemeClr val="dk1"/>
+          </a:fillRef>
+          <a:effectRef idx="0">
+            <a:schemeClr val="dk1"/>
+          </a:effectRef>
+          <a:fontRef idx="minor">
+            <a:schemeClr val="tx1"/>
+          </a:fontRef>
+        </p:style>
+      </p:cxnSp>
+      <p:cxnSp>
+        <p:nvCxnSpPr>
+          <p:cNvPr id="65" name="Straight Connector 64"/>
+          <p:cNvCxnSpPr/>
+          <p:nvPr/>
+        </p:nvCxnSpPr>
+        <p:spPr>
+          <a:xfrm>
+            <a:off x="-24934" y="15252519"/>
+            <a:ext cx="12042958" cy="0"/>
+          </a:xfrm>
+          <a:prstGeom prst="line">
+            <a:avLst/>
+          </a:prstGeom>
+        </p:spPr>
+        <p:style>
+          <a:lnRef idx="1">
+            <a:schemeClr val="dk1"/>
+          </a:lnRef>
+          <a:fillRef idx="0">
+            <a:schemeClr val="dk1"/>
+          </a:fillRef>
+          <a:effectRef idx="0">
+            <a:schemeClr val="dk1"/>
+          </a:effectRef>
+          <a:fontRef idx="minor">
+            <a:schemeClr val="tx1"/>
+          </a:fontRef>
+        </p:style>
+      </p:cxnSp>
     </p:spTree>
     <p:extLst>
       <p:ext uri="{BB962C8B-B14F-4D97-AF65-F5344CB8AC3E}">
@@ -3037,7 +4385,7 @@
         </p:blipFill>
         <p:spPr>
           <a:xfrm>
-            <a:off x="4260105" y="1376675"/>
+            <a:off x="4171205" y="1358006"/>
             <a:ext cx="3849590" cy="3714252"/>
           </a:xfrm>
           <a:prstGeom prst="rect">
@@ -3061,7 +4409,7 @@
         </p:blipFill>
         <p:spPr>
           <a:xfrm>
-            <a:off x="8109695" y="5045097"/>
+            <a:off x="8708604" y="4984800"/>
             <a:ext cx="1327942" cy="490074"/>
           </a:xfrm>
           <a:prstGeom prst="rect">
@@ -3208,7 +4556,7 @@
           <a:p>
             <a:r>
               <a:rPr lang="en-US" dirty="0"/>
-              <a:t>[5 sentence limit??]</a:t>
+              <a:t>[Displays only 5 sentences, clicks to open]</a:t>
             </a:r>
           </a:p>
           <a:p>
@@ -3258,7 +4606,7 @@
         <p:spPr>
           <a:xfrm>
             <a:off x="419098" y="757943"/>
-            <a:ext cx="11633200" cy="369332"/>
+            <a:ext cx="11633200" cy="646331"/>
           </a:xfrm>
           <a:prstGeom prst="rect">
             <a:avLst/>
@@ -3273,7 +4621,13 @@
           <a:p>
             <a:r>
               <a:rPr lang="en-US" dirty="0"/>
-              <a:t>Expedited graduation date:                                        BRANDON TORRES                                               MECHANICAL ENGINEERING</a:t>
+              <a:t>Expedited graduation date:                                       BRANDON TORRES                                               MECHANICAL ENGINEERING</a:t>
+            </a:r>
+          </a:p>
+          <a:p>
+            <a:r>
+              <a:rPr lang="en-US" dirty="0"/>
+              <a:t>May 2017</a:t>
             </a:r>
           </a:p>
         </p:txBody>
@@ -3519,42 +4873,13 @@
       </p:sp>
       <p:sp>
         <p:nvSpPr>
-          <p:cNvPr id="23" name="TextBox 22"/>
-          <p:cNvSpPr txBox="1"/>
-          <p:nvPr/>
-        </p:nvSpPr>
-        <p:spPr>
-          <a:xfrm>
-            <a:off x="11033123" y="1999077"/>
-            <a:ext cx="1019175" cy="369332"/>
-          </a:xfrm>
-          <a:prstGeom prst="rect">
-            <a:avLst/>
-          </a:prstGeom>
-          <a:noFill/>
-        </p:spPr>
-        <p:txBody>
-          <a:bodyPr wrap="square" rtlCol="0">
-            <a:spAutoFit/>
-          </a:bodyPr>
-          <a:lstStyle/>
-          <a:p>
-            <a:r>
-              <a:rPr lang="en-US" dirty="0"/>
-              <a:t>Message</a:t>
-            </a:r>
-          </a:p>
-        </p:txBody>
-      </p:sp>
-      <p:sp>
-        <p:nvSpPr>
           <p:cNvPr id="24" name="TextBox 23"/>
           <p:cNvSpPr txBox="1"/>
           <p:nvPr/>
         </p:nvSpPr>
         <p:spPr>
           <a:xfrm>
-            <a:off x="11033123" y="2696638"/>
+            <a:off x="7685871" y="5116256"/>
             <a:ext cx="1019175" cy="369332"/>
           </a:xfrm>
           <a:prstGeom prst="rect">
@@ -3794,10 +5119,1547 @@
           </a:p>
         </p:txBody>
       </p:sp>
+      <p:sp>
+        <p:nvSpPr>
+          <p:cNvPr id="26" name="TextBox 25"/>
+          <p:cNvSpPr txBox="1"/>
+          <p:nvPr/>
+        </p:nvSpPr>
+        <p:spPr>
+          <a:xfrm>
+            <a:off x="6235698" y="5117800"/>
+            <a:ext cx="1156672" cy="369332"/>
+          </a:xfrm>
+          <a:prstGeom prst="rect">
+            <a:avLst/>
+          </a:prstGeom>
+          <a:noFill/>
+        </p:spPr>
+        <p:txBody>
+          <a:bodyPr wrap="square" rtlCol="0">
+            <a:spAutoFit/>
+          </a:bodyPr>
+          <a:lstStyle/>
+          <a:p>
+            <a:r>
+              <a:rPr lang="en-US" dirty="0"/>
+              <a:t>MESSAGE</a:t>
+            </a:r>
+          </a:p>
+        </p:txBody>
+      </p:sp>
     </p:spTree>
     <p:extLst>
       <p:ext uri="{BB962C8B-B14F-4D97-AF65-F5344CB8AC3E}">
         <p14:creationId xmlns:p14="http://schemas.microsoft.com/office/powerpoint/2010/main" val="2146525748"/>
+      </p:ext>
+    </p:extLst>
+  </p:cSld>
+  <p:clrMapOvr>
+    <a:masterClrMapping/>
+  </p:clrMapOvr>
+</p:sld>
+</file>
+
+<file path=ppt/slides/slide3.xml><?xml version="1.0" encoding="utf-8"?>
+<p:sld xmlns:a="http://schemas.openxmlformats.org/drawingml/2006/main" xmlns:r="http://schemas.openxmlformats.org/officeDocument/2006/relationships" xmlns:p="http://schemas.openxmlformats.org/presentationml/2006/main">
+  <p:cSld>
+    <p:spTree>
+      <p:nvGrpSpPr>
+        <p:cNvPr id="1" name=""/>
+        <p:cNvGrpSpPr/>
+        <p:nvPr/>
+      </p:nvGrpSpPr>
+      <p:grpSpPr>
+        <a:xfrm>
+          <a:off x="0" y="0"/>
+          <a:ext cx="0" cy="0"/>
+          <a:chOff x="0" y="0"/>
+          <a:chExt cx="0" cy="0"/>
+        </a:xfrm>
+      </p:grpSpPr>
+      <p:pic>
+        <p:nvPicPr>
+          <p:cNvPr id="4" name="Picture 3"/>
+          <p:cNvPicPr>
+            <a:picLocks noChangeAspect="1"/>
+          </p:cNvPicPr>
+          <p:nvPr/>
+        </p:nvPicPr>
+        <p:blipFill>
+          <a:blip r:embed="rId2"/>
+          <a:stretch>
+            <a:fillRect/>
+          </a:stretch>
+        </p:blipFill>
+        <p:spPr>
+          <a:xfrm>
+            <a:off x="0" y="0"/>
+            <a:ext cx="12192000" cy="384772"/>
+          </a:xfrm>
+          <a:prstGeom prst="rect">
+            <a:avLst/>
+          </a:prstGeom>
+        </p:spPr>
+      </p:pic>
+      <p:pic>
+        <p:nvPicPr>
+          <p:cNvPr id="5" name="Picture 4"/>
+          <p:cNvPicPr>
+            <a:picLocks noChangeAspect="1"/>
+          </p:cNvPicPr>
+          <p:nvPr/>
+        </p:nvPicPr>
+        <p:blipFill>
+          <a:blip r:embed="rId3"/>
+          <a:stretch>
+            <a:fillRect/>
+          </a:stretch>
+        </p:blipFill>
+        <p:spPr>
+          <a:xfrm>
+            <a:off x="3783740" y="1893630"/>
+            <a:ext cx="4381860" cy="4238011"/>
+          </a:xfrm>
+          <a:prstGeom prst="rect">
+            <a:avLst/>
+          </a:prstGeom>
+        </p:spPr>
+      </p:pic>
+      <p:sp>
+        <p:nvSpPr>
+          <p:cNvPr id="6" name="Rectangle 5"/>
+          <p:cNvSpPr/>
+          <p:nvPr/>
+        </p:nvSpPr>
+        <p:spPr>
+          <a:xfrm>
+            <a:off x="637417" y="3216677"/>
+            <a:ext cx="3146323" cy="1505580"/>
+          </a:xfrm>
+          <a:prstGeom prst="rect">
+            <a:avLst/>
+          </a:prstGeom>
+        </p:spPr>
+        <p:txBody>
+          <a:bodyPr wrap="square">
+            <a:spAutoFit/>
+          </a:bodyPr>
+          <a:lstStyle/>
+          <a:p>
+            <a:r>
+              <a:rPr lang="en-US" b="1" dirty="0"/>
+              <a:t>Members</a:t>
+            </a:r>
+            <a:r>
+              <a:rPr lang="en-US" dirty="0"/>
+              <a:t>:</a:t>
+            </a:r>
+          </a:p>
+          <a:p>
+            <a:r>
+              <a:rPr lang="en-US" dirty="0"/>
+              <a:t>President: Bob Johnson</a:t>
+            </a:r>
+          </a:p>
+          <a:p>
+            <a:r>
+              <a:rPr lang="en-US" dirty="0"/>
+              <a:t>Vice President- Sarah Sue</a:t>
+            </a:r>
+          </a:p>
+          <a:p>
+            <a:r>
+              <a:rPr lang="en-US" dirty="0"/>
+              <a:t>CSC Involved: Joe </a:t>
+            </a:r>
+            <a:r>
+              <a:rPr lang="en-US" dirty="0" err="1"/>
+              <a:t>Muenk</a:t>
+            </a:r>
+            <a:endParaRPr lang="en-US" dirty="0"/>
+          </a:p>
+          <a:p>
+            <a:r>
+              <a:rPr lang="en-US" dirty="0"/>
+              <a:t>more...</a:t>
+            </a:r>
+          </a:p>
+        </p:txBody>
+      </p:sp>
+      <p:sp>
+        <p:nvSpPr>
+          <p:cNvPr id="7" name="Rectangle 6"/>
+          <p:cNvSpPr/>
+          <p:nvPr/>
+        </p:nvSpPr>
+        <p:spPr>
+          <a:xfrm>
+            <a:off x="394759" y="659810"/>
+            <a:ext cx="11016191" cy="707886"/>
+          </a:xfrm>
+          <a:prstGeom prst="rect">
+            <a:avLst/>
+          </a:prstGeom>
+        </p:spPr>
+        <p:txBody>
+          <a:bodyPr wrap="square">
+            <a:spAutoFit/>
+          </a:bodyPr>
+          <a:lstStyle/>
+          <a:p>
+            <a:pPr algn="ctr"/>
+            <a:r>
+              <a:rPr lang="en-US" sz="4000" b="1" dirty="0"/>
+              <a:t>ASME: American Society of Mechanical Engineers</a:t>
+            </a:r>
+          </a:p>
+        </p:txBody>
+      </p:sp>
+      <p:sp>
+        <p:nvSpPr>
+          <p:cNvPr id="8" name="Rectangle 7"/>
+          <p:cNvSpPr/>
+          <p:nvPr/>
+        </p:nvSpPr>
+        <p:spPr>
+          <a:xfrm>
+            <a:off x="637417" y="2119986"/>
+            <a:ext cx="2206414" cy="646331"/>
+          </a:xfrm>
+          <a:prstGeom prst="rect">
+            <a:avLst/>
+          </a:prstGeom>
+        </p:spPr>
+        <p:txBody>
+          <a:bodyPr wrap="square">
+            <a:spAutoFit/>
+          </a:bodyPr>
+          <a:lstStyle/>
+          <a:p>
+            <a:r>
+              <a:rPr lang="en-US" dirty="0"/>
+              <a:t>UNIVERSITY OF MISSOURI COLUMBIA</a:t>
+            </a:r>
+          </a:p>
+        </p:txBody>
+      </p:sp>
+      <p:sp>
+        <p:nvSpPr>
+          <p:cNvPr id="9" name="Rectangle 8"/>
+          <p:cNvSpPr/>
+          <p:nvPr/>
+        </p:nvSpPr>
+        <p:spPr>
+          <a:xfrm>
+            <a:off x="8408260" y="1981311"/>
+            <a:ext cx="3321269" cy="2031325"/>
+          </a:xfrm>
+          <a:prstGeom prst="rect">
+            <a:avLst/>
+          </a:prstGeom>
+        </p:spPr>
+        <p:txBody>
+          <a:bodyPr wrap="square">
+            <a:spAutoFit/>
+          </a:bodyPr>
+          <a:lstStyle/>
+          <a:p>
+            <a:r>
+              <a:rPr lang="en-US" dirty="0"/>
+              <a:t>MEETINGS:</a:t>
+            </a:r>
+          </a:p>
+          <a:p>
+            <a:endParaRPr lang="en-US" dirty="0"/>
+          </a:p>
+          <a:p>
+            <a:r>
+              <a:rPr lang="en-US" dirty="0"/>
+              <a:t>BUILD TEAM MEETINGS: MWF 6:00pm</a:t>
+            </a:r>
+          </a:p>
+          <a:p>
+            <a:endParaRPr lang="en-US" dirty="0"/>
+          </a:p>
+          <a:p>
+            <a:r>
+              <a:rPr lang="en-US" dirty="0"/>
+              <a:t>NEXT MONTHLY </a:t>
+            </a:r>
+            <a:r>
+              <a:rPr lang="en-US" dirty="0" err="1"/>
+              <a:t>MEETING:June</a:t>
+            </a:r>
+            <a:r>
+              <a:rPr lang="en-US" dirty="0"/>
+              <a:t> 2 2017 time = 6:00pm</a:t>
+            </a:r>
+          </a:p>
+        </p:txBody>
+      </p:sp>
+      <p:pic>
+        <p:nvPicPr>
+          <p:cNvPr id="11" name="Picture 10"/>
+          <p:cNvPicPr>
+            <a:picLocks noChangeAspect="1"/>
+          </p:cNvPicPr>
+          <p:nvPr/>
+        </p:nvPicPr>
+        <p:blipFill>
+          <a:blip r:embed="rId4"/>
+          <a:stretch>
+            <a:fillRect/>
+          </a:stretch>
+        </p:blipFill>
+        <p:spPr>
+          <a:xfrm>
+            <a:off x="3088595" y="7172551"/>
+            <a:ext cx="5772150" cy="2371725"/>
+          </a:xfrm>
+          <a:prstGeom prst="rect">
+            <a:avLst/>
+          </a:prstGeom>
+        </p:spPr>
+      </p:pic>
+      <p:sp>
+        <p:nvSpPr>
+          <p:cNvPr id="12" name="Rectangle 11"/>
+          <p:cNvSpPr/>
+          <p:nvPr/>
+        </p:nvSpPr>
+        <p:spPr>
+          <a:xfrm>
+            <a:off x="3460955" y="9995765"/>
+            <a:ext cx="6096000" cy="1200329"/>
+          </a:xfrm>
+          <a:prstGeom prst="rect">
+            <a:avLst/>
+          </a:prstGeom>
+        </p:spPr>
+        <p:txBody>
+          <a:bodyPr>
+            <a:spAutoFit/>
+          </a:bodyPr>
+          <a:lstStyle/>
+          <a:p>
+            <a:r>
+              <a:rPr lang="en-US" dirty="0"/>
+              <a:t>COMPETITIONS:</a:t>
+            </a:r>
+          </a:p>
+          <a:p>
+            <a:r>
+              <a:rPr lang="en-US" dirty="0"/>
+              <a:t>ASME ROBOTICS 2017</a:t>
+            </a:r>
+          </a:p>
+          <a:p>
+            <a:r>
+              <a:rPr lang="en-US" dirty="0"/>
+              <a:t>ASME ROBOTICS 2016</a:t>
+            </a:r>
+          </a:p>
+          <a:p>
+            <a:r>
+              <a:rPr lang="en-US" dirty="0"/>
+              <a:t>ESRA 3D MECHANICS 2015 </a:t>
+            </a:r>
+          </a:p>
+        </p:txBody>
+      </p:sp>
+      <p:sp>
+        <p:nvSpPr>
+          <p:cNvPr id="13" name="Rectangle 12"/>
+          <p:cNvSpPr/>
+          <p:nvPr/>
+        </p:nvSpPr>
+        <p:spPr>
+          <a:xfrm>
+            <a:off x="3443171" y="11468073"/>
+            <a:ext cx="6096000" cy="1477328"/>
+          </a:xfrm>
+          <a:prstGeom prst="rect">
+            <a:avLst/>
+          </a:prstGeom>
+        </p:spPr>
+        <p:txBody>
+          <a:bodyPr>
+            <a:spAutoFit/>
+          </a:bodyPr>
+          <a:lstStyle/>
+          <a:p>
+            <a:r>
+              <a:rPr lang="en-US" dirty="0"/>
+              <a:t>MAJOR: </a:t>
+            </a:r>
+          </a:p>
+          <a:p>
+            <a:r>
+              <a:rPr lang="en-US" dirty="0"/>
+              <a:t>90% MECHANICAL</a:t>
+            </a:r>
+          </a:p>
+          <a:p>
+            <a:r>
+              <a:rPr lang="en-US" dirty="0"/>
+              <a:t>5% ELECTRICAL</a:t>
+            </a:r>
+          </a:p>
+          <a:p>
+            <a:r>
+              <a:rPr lang="en-US" dirty="0"/>
+              <a:t>3% COMPUTER SCIENCE</a:t>
+            </a:r>
+          </a:p>
+          <a:p>
+            <a:r>
+              <a:rPr lang="en-US" dirty="0"/>
+              <a:t>2% BUSINESS</a:t>
+            </a:r>
+          </a:p>
+        </p:txBody>
+      </p:sp>
+      <p:sp>
+        <p:nvSpPr>
+          <p:cNvPr id="14" name="TextBox 13"/>
+          <p:cNvSpPr txBox="1"/>
+          <p:nvPr/>
+        </p:nvSpPr>
+        <p:spPr>
+          <a:xfrm>
+            <a:off x="104049" y="14704047"/>
+            <a:ext cx="5559179" cy="6463308"/>
+          </a:xfrm>
+          <a:prstGeom prst="rect">
+            <a:avLst/>
+          </a:prstGeom>
+          <a:noFill/>
+        </p:spPr>
+        <p:txBody>
+          <a:bodyPr wrap="square" rtlCol="0">
+            <a:spAutoFit/>
+          </a:bodyPr>
+          <a:lstStyle/>
+          <a:p>
+            <a:r>
+              <a:rPr lang="en-US" b="1" dirty="0"/>
+              <a:t>       [ASME] American Society of Mechanical Engineers </a:t>
+            </a:r>
+            <a:r>
+              <a:rPr lang="en-US" dirty="0"/>
+              <a:t>–</a:t>
+            </a:r>
+          </a:p>
+          <a:p>
+            <a:r>
+              <a:rPr lang="en-US" dirty="0"/>
+              <a:t>DATE: 01-25-2017 </a:t>
+            </a:r>
+          </a:p>
+          <a:p>
+            <a:endParaRPr lang="en-US" dirty="0"/>
+          </a:p>
+          <a:p>
+            <a:r>
+              <a:rPr lang="en-US" dirty="0"/>
+              <a:t>We have a robotics team that travels around the world and competes against all different universities. The team is lead by Brandon Torres, a senior mechanical Engineer as well as advisor Dr. </a:t>
+            </a:r>
+            <a:r>
+              <a:rPr lang="en-US" dirty="0" err="1"/>
+              <a:t>Solbreken</a:t>
+            </a:r>
+            <a:r>
+              <a:rPr lang="en-US" dirty="0"/>
+              <a:t>. Together we learn to overcome real world challenges in a smaller scale through competition. If you are into robotics, challenges, and competition please follow us on CSC and come to our meetings!!!</a:t>
+            </a:r>
+          </a:p>
+          <a:p>
+            <a:endParaRPr lang="en-US" dirty="0"/>
+          </a:p>
+          <a:p>
+            <a:endParaRPr lang="en-US" dirty="0"/>
+          </a:p>
+          <a:p>
+            <a:endParaRPr lang="en-US" dirty="0"/>
+          </a:p>
+          <a:p>
+            <a:endParaRPr lang="en-US" dirty="0"/>
+          </a:p>
+          <a:p>
+            <a:endParaRPr lang="en-US" dirty="0"/>
+          </a:p>
+          <a:p>
+            <a:endParaRPr lang="en-US" dirty="0"/>
+          </a:p>
+          <a:p>
+            <a:endParaRPr lang="en-US" dirty="0"/>
+          </a:p>
+          <a:p>
+            <a:endParaRPr lang="en-US" dirty="0"/>
+          </a:p>
+          <a:p>
+            <a:endParaRPr lang="en-US" dirty="0"/>
+          </a:p>
+          <a:p>
+            <a:endParaRPr lang="en-US" dirty="0"/>
+          </a:p>
+          <a:p>
+            <a:endParaRPr lang="en-US" dirty="0"/>
+          </a:p>
+          <a:p>
+            <a:endParaRPr lang="en-US" dirty="0"/>
+          </a:p>
+        </p:txBody>
+      </p:sp>
+      <p:pic>
+        <p:nvPicPr>
+          <p:cNvPr id="15" name="Picture 14"/>
+          <p:cNvPicPr>
+            <a:picLocks noChangeAspect="1"/>
+          </p:cNvPicPr>
+          <p:nvPr/>
+        </p:nvPicPr>
+        <p:blipFill>
+          <a:blip r:embed="rId5"/>
+          <a:stretch>
+            <a:fillRect/>
+          </a:stretch>
+        </p:blipFill>
+        <p:spPr>
+          <a:xfrm>
+            <a:off x="5950372" y="14637206"/>
+            <a:ext cx="5460578" cy="3060244"/>
+          </a:xfrm>
+          <a:prstGeom prst="rect">
+            <a:avLst/>
+          </a:prstGeom>
+        </p:spPr>
+      </p:pic>
+      <p:pic>
+        <p:nvPicPr>
+          <p:cNvPr id="16" name="Picture 15"/>
+          <p:cNvPicPr>
+            <a:picLocks noChangeAspect="1"/>
+          </p:cNvPicPr>
+          <p:nvPr/>
+        </p:nvPicPr>
+        <p:blipFill>
+          <a:blip r:embed="rId6"/>
+          <a:stretch>
+            <a:fillRect/>
+          </a:stretch>
+        </p:blipFill>
+        <p:spPr>
+          <a:xfrm rot="5400000">
+            <a:off x="6574858" y="17416224"/>
+            <a:ext cx="4110845" cy="5505244"/>
+          </a:xfrm>
+          <a:prstGeom prst="rect">
+            <a:avLst/>
+          </a:prstGeom>
+        </p:spPr>
+      </p:pic>
+      <p:pic>
+        <p:nvPicPr>
+          <p:cNvPr id="20" name="Picture 19"/>
+          <p:cNvPicPr>
+            <a:picLocks noChangeAspect="1"/>
+          </p:cNvPicPr>
+          <p:nvPr/>
+        </p:nvPicPr>
+        <p:blipFill>
+          <a:blip r:embed="rId7"/>
+          <a:stretch>
+            <a:fillRect/>
+          </a:stretch>
+        </p:blipFill>
+        <p:spPr>
+          <a:xfrm>
+            <a:off x="3783740" y="6248838"/>
+            <a:ext cx="3248025" cy="238125"/>
+          </a:xfrm>
+          <a:prstGeom prst="rect">
+            <a:avLst/>
+          </a:prstGeom>
+        </p:spPr>
+      </p:pic>
+    </p:spTree>
+    <p:extLst>
+      <p:ext uri="{BB962C8B-B14F-4D97-AF65-F5344CB8AC3E}">
+        <p14:creationId xmlns:p14="http://schemas.microsoft.com/office/powerpoint/2010/main" val="1959011656"/>
+      </p:ext>
+    </p:extLst>
+  </p:cSld>
+  <p:clrMapOvr>
+    <a:masterClrMapping/>
+  </p:clrMapOvr>
+</p:sld>
+</file>
+
+<file path=ppt/slides/slide4.xml><?xml version="1.0" encoding="utf-8"?>
+<p:sld xmlns:a="http://schemas.openxmlformats.org/drawingml/2006/main" xmlns:r="http://schemas.openxmlformats.org/officeDocument/2006/relationships" xmlns:p="http://schemas.openxmlformats.org/presentationml/2006/main">
+  <p:cSld>
+    <p:spTree>
+      <p:nvGrpSpPr>
+        <p:cNvPr id="1" name=""/>
+        <p:cNvGrpSpPr/>
+        <p:nvPr/>
+      </p:nvGrpSpPr>
+      <p:grpSpPr>
+        <a:xfrm>
+          <a:off x="0" y="0"/>
+          <a:ext cx="0" cy="0"/>
+          <a:chOff x="0" y="0"/>
+          <a:chExt cx="0" cy="0"/>
+        </a:xfrm>
+      </p:grpSpPr>
+      <p:pic>
+        <p:nvPicPr>
+          <p:cNvPr id="4" name="Picture 3"/>
+          <p:cNvPicPr>
+            <a:picLocks noChangeAspect="1"/>
+          </p:cNvPicPr>
+          <p:nvPr/>
+        </p:nvPicPr>
+        <p:blipFill>
+          <a:blip r:embed="rId2"/>
+          <a:stretch>
+            <a:fillRect/>
+          </a:stretch>
+        </p:blipFill>
+        <p:spPr>
+          <a:xfrm>
+            <a:off x="593947" y="3010883"/>
+            <a:ext cx="3642414" cy="2400300"/>
+          </a:xfrm>
+          <a:prstGeom prst="rect">
+            <a:avLst/>
+          </a:prstGeom>
+        </p:spPr>
+      </p:pic>
+      <p:pic>
+        <p:nvPicPr>
+          <p:cNvPr id="5" name="Picture 4"/>
+          <p:cNvPicPr>
+            <a:picLocks noChangeAspect="1"/>
+          </p:cNvPicPr>
+          <p:nvPr/>
+        </p:nvPicPr>
+        <p:blipFill>
+          <a:blip r:embed="rId3"/>
+          <a:stretch>
+            <a:fillRect/>
+          </a:stretch>
+        </p:blipFill>
+        <p:spPr>
+          <a:xfrm>
+            <a:off x="0" y="0"/>
+            <a:ext cx="12192000" cy="384772"/>
+          </a:xfrm>
+          <a:prstGeom prst="rect">
+            <a:avLst/>
+          </a:prstGeom>
+        </p:spPr>
+      </p:pic>
+      <p:pic>
+        <p:nvPicPr>
+          <p:cNvPr id="6" name="Picture 5"/>
+          <p:cNvPicPr>
+            <a:picLocks noChangeAspect="1"/>
+          </p:cNvPicPr>
+          <p:nvPr/>
+        </p:nvPicPr>
+        <p:blipFill>
+          <a:blip r:embed="rId4"/>
+          <a:stretch>
+            <a:fillRect/>
+          </a:stretch>
+        </p:blipFill>
+        <p:spPr>
+          <a:xfrm>
+            <a:off x="6467585" y="13631920"/>
+            <a:ext cx="3833246" cy="3397307"/>
+          </a:xfrm>
+          <a:prstGeom prst="rect">
+            <a:avLst/>
+          </a:prstGeom>
+        </p:spPr>
+      </p:pic>
+      <p:sp>
+        <p:nvSpPr>
+          <p:cNvPr id="8" name="Rectangle 7"/>
+          <p:cNvSpPr/>
+          <p:nvPr/>
+        </p:nvSpPr>
+        <p:spPr>
+          <a:xfrm>
+            <a:off x="2415154" y="674470"/>
+            <a:ext cx="7361692" cy="707886"/>
+          </a:xfrm>
+          <a:prstGeom prst="rect">
+            <a:avLst/>
+          </a:prstGeom>
+        </p:spPr>
+        <p:txBody>
+          <a:bodyPr wrap="square">
+            <a:spAutoFit/>
+          </a:bodyPr>
+          <a:lstStyle/>
+          <a:p>
+            <a:pPr algn="ctr"/>
+            <a:r>
+              <a:rPr lang="en-US" sz="4000" b="1" dirty="0"/>
+              <a:t>BOEING</a:t>
+            </a:r>
+          </a:p>
+        </p:txBody>
+      </p:sp>
+      <p:pic>
+        <p:nvPicPr>
+          <p:cNvPr id="9" name="Picture 8"/>
+          <p:cNvPicPr>
+            <a:picLocks noChangeAspect="1"/>
+          </p:cNvPicPr>
+          <p:nvPr/>
+        </p:nvPicPr>
+        <p:blipFill>
+          <a:blip r:embed="rId5"/>
+          <a:stretch>
+            <a:fillRect/>
+          </a:stretch>
+        </p:blipFill>
+        <p:spPr>
+          <a:xfrm>
+            <a:off x="441138" y="5583704"/>
+            <a:ext cx="3948032" cy="1794560"/>
+          </a:xfrm>
+          <a:prstGeom prst="rect">
+            <a:avLst/>
+          </a:prstGeom>
+        </p:spPr>
+      </p:pic>
+      <p:pic>
+        <p:nvPicPr>
+          <p:cNvPr id="10" name="Picture 9"/>
+          <p:cNvPicPr>
+            <a:picLocks noChangeAspect="1"/>
+          </p:cNvPicPr>
+          <p:nvPr/>
+        </p:nvPicPr>
+        <p:blipFill>
+          <a:blip r:embed="rId6"/>
+          <a:stretch>
+            <a:fillRect/>
+          </a:stretch>
+        </p:blipFill>
+        <p:spPr>
+          <a:xfrm>
+            <a:off x="4979311" y="3029933"/>
+            <a:ext cx="6809794" cy="2381250"/>
+          </a:xfrm>
+          <a:prstGeom prst="rect">
+            <a:avLst/>
+          </a:prstGeom>
+        </p:spPr>
+      </p:pic>
+      <p:sp>
+        <p:nvSpPr>
+          <p:cNvPr id="12" name="TextBox 11"/>
+          <p:cNvSpPr txBox="1"/>
+          <p:nvPr/>
+        </p:nvSpPr>
+        <p:spPr>
+          <a:xfrm>
+            <a:off x="1005454" y="7806461"/>
+            <a:ext cx="4450439" cy="461665"/>
+          </a:xfrm>
+          <a:prstGeom prst="rect">
+            <a:avLst/>
+          </a:prstGeom>
+          <a:noFill/>
+        </p:spPr>
+        <p:txBody>
+          <a:bodyPr wrap="square" rtlCol="0">
+            <a:spAutoFit/>
+          </a:bodyPr>
+          <a:lstStyle/>
+          <a:p>
+            <a:r>
+              <a:rPr lang="en-US" sz="2400" dirty="0"/>
+              <a:t>ABOUT</a:t>
+            </a:r>
+            <a:r>
+              <a:rPr lang="en-US" dirty="0"/>
+              <a:t>:</a:t>
+            </a:r>
+          </a:p>
+        </p:txBody>
+      </p:sp>
+      <p:pic>
+        <p:nvPicPr>
+          <p:cNvPr id="13" name="Picture 12"/>
+          <p:cNvPicPr>
+            <a:picLocks noChangeAspect="1"/>
+          </p:cNvPicPr>
+          <p:nvPr/>
+        </p:nvPicPr>
+        <p:blipFill>
+          <a:blip r:embed="rId7"/>
+          <a:stretch>
+            <a:fillRect/>
+          </a:stretch>
+        </p:blipFill>
+        <p:spPr>
+          <a:xfrm>
+            <a:off x="2415153" y="8305601"/>
+            <a:ext cx="7437893" cy="4331846"/>
+          </a:xfrm>
+          <a:prstGeom prst="rect">
+            <a:avLst/>
+          </a:prstGeom>
+        </p:spPr>
+      </p:pic>
+      <p:sp>
+        <p:nvSpPr>
+          <p:cNvPr id="14" name="TextBox 13"/>
+          <p:cNvSpPr txBox="1"/>
+          <p:nvPr/>
+        </p:nvSpPr>
+        <p:spPr>
+          <a:xfrm>
+            <a:off x="863034" y="13305001"/>
+            <a:ext cx="4450439" cy="461665"/>
+          </a:xfrm>
+          <a:prstGeom prst="rect">
+            <a:avLst/>
+          </a:prstGeom>
+          <a:noFill/>
+        </p:spPr>
+        <p:txBody>
+          <a:bodyPr wrap="square" rtlCol="0">
+            <a:spAutoFit/>
+          </a:bodyPr>
+          <a:lstStyle/>
+          <a:p>
+            <a:r>
+              <a:rPr lang="en-US" sz="2400" dirty="0"/>
+              <a:t>COMPETITIONS</a:t>
+            </a:r>
+            <a:r>
+              <a:rPr lang="en-US" dirty="0"/>
+              <a:t>:</a:t>
+            </a:r>
+          </a:p>
+        </p:txBody>
+      </p:sp>
+      <p:sp>
+        <p:nvSpPr>
+          <p:cNvPr id="15" name="TextBox 14"/>
+          <p:cNvSpPr txBox="1"/>
+          <p:nvPr/>
+        </p:nvSpPr>
+        <p:spPr>
+          <a:xfrm>
+            <a:off x="1538854" y="13766666"/>
+            <a:ext cx="3098800" cy="2031325"/>
+          </a:xfrm>
+          <a:prstGeom prst="rect">
+            <a:avLst/>
+          </a:prstGeom>
+          <a:noFill/>
+        </p:spPr>
+        <p:txBody>
+          <a:bodyPr wrap="square" rtlCol="0">
+            <a:spAutoFit/>
+          </a:bodyPr>
+          <a:lstStyle/>
+          <a:p>
+            <a:r>
+              <a:rPr lang="en-US" dirty="0"/>
+              <a:t>IDSC THE CHALLENGE: </a:t>
+            </a:r>
+          </a:p>
+          <a:p>
+            <a:endParaRPr lang="en-US" dirty="0"/>
+          </a:p>
+          <a:p>
+            <a:r>
+              <a:rPr lang="en-US" dirty="0"/>
+              <a:t>DATE: MAY 1 2018</a:t>
+            </a:r>
+          </a:p>
+          <a:p>
+            <a:r>
+              <a:rPr lang="en-US" dirty="0"/>
+              <a:t>WHO: ASME MEMBERS</a:t>
+            </a:r>
+          </a:p>
+          <a:p>
+            <a:r>
+              <a:rPr lang="en-US" dirty="0"/>
+              <a:t>WHERE: TBD</a:t>
+            </a:r>
+          </a:p>
+          <a:p>
+            <a:endParaRPr lang="en-US" dirty="0"/>
+          </a:p>
+          <a:p>
+            <a:endParaRPr lang="en-US" dirty="0"/>
+          </a:p>
+        </p:txBody>
+      </p:sp>
+      <p:pic>
+        <p:nvPicPr>
+          <p:cNvPr id="16" name="Picture 15"/>
+          <p:cNvPicPr>
+            <a:picLocks noChangeAspect="1"/>
+          </p:cNvPicPr>
+          <p:nvPr/>
+        </p:nvPicPr>
+        <p:blipFill>
+          <a:blip r:embed="rId8"/>
+          <a:stretch>
+            <a:fillRect/>
+          </a:stretch>
+        </p:blipFill>
+        <p:spPr>
+          <a:xfrm>
+            <a:off x="6467585" y="17791134"/>
+            <a:ext cx="3305175" cy="6134100"/>
+          </a:xfrm>
+          <a:prstGeom prst="rect">
+            <a:avLst/>
+          </a:prstGeom>
+        </p:spPr>
+      </p:pic>
+      <p:sp>
+        <p:nvSpPr>
+          <p:cNvPr id="17" name="TextBox 16"/>
+          <p:cNvSpPr txBox="1"/>
+          <p:nvPr/>
+        </p:nvSpPr>
+        <p:spPr>
+          <a:xfrm>
+            <a:off x="1538854" y="17662078"/>
+            <a:ext cx="3098800" cy="2031325"/>
+          </a:xfrm>
+          <a:prstGeom prst="rect">
+            <a:avLst/>
+          </a:prstGeom>
+          <a:noFill/>
+        </p:spPr>
+        <p:txBody>
+          <a:bodyPr wrap="square" rtlCol="0">
+            <a:spAutoFit/>
+          </a:bodyPr>
+          <a:lstStyle/>
+          <a:p>
+            <a:r>
+              <a:rPr lang="en-US" dirty="0"/>
+              <a:t>THE ROBOT PENTATHLON</a:t>
+            </a:r>
+          </a:p>
+          <a:p>
+            <a:endParaRPr lang="en-US" dirty="0"/>
+          </a:p>
+          <a:p>
+            <a:r>
+              <a:rPr lang="en-US" dirty="0"/>
+              <a:t>DATE: JUNE 11 2018</a:t>
+            </a:r>
+          </a:p>
+          <a:p>
+            <a:r>
+              <a:rPr lang="en-US" dirty="0"/>
+              <a:t>WHO: ASME MEMBERS</a:t>
+            </a:r>
+          </a:p>
+          <a:p>
+            <a:r>
+              <a:rPr lang="en-US" dirty="0"/>
+              <a:t>WHERE: TBD</a:t>
+            </a:r>
+          </a:p>
+          <a:p>
+            <a:endParaRPr lang="en-US" dirty="0"/>
+          </a:p>
+          <a:p>
+            <a:endParaRPr lang="en-US" dirty="0"/>
+          </a:p>
+        </p:txBody>
+      </p:sp>
+      <p:pic>
+        <p:nvPicPr>
+          <p:cNvPr id="20" name="Picture 19"/>
+          <p:cNvPicPr>
+            <a:picLocks noChangeAspect="1"/>
+          </p:cNvPicPr>
+          <p:nvPr/>
+        </p:nvPicPr>
+        <p:blipFill>
+          <a:blip r:embed="rId9"/>
+          <a:stretch>
+            <a:fillRect/>
+          </a:stretch>
+        </p:blipFill>
+        <p:spPr>
+          <a:xfrm>
+            <a:off x="9552207" y="5985684"/>
+            <a:ext cx="2457450" cy="495300"/>
+          </a:xfrm>
+          <a:prstGeom prst="rect">
+            <a:avLst/>
+          </a:prstGeom>
+        </p:spPr>
+      </p:pic>
+      <p:sp>
+        <p:nvSpPr>
+          <p:cNvPr id="21" name="TextBox 20"/>
+          <p:cNvSpPr txBox="1"/>
+          <p:nvPr/>
+        </p:nvSpPr>
+        <p:spPr>
+          <a:xfrm>
+            <a:off x="9772760" y="5421647"/>
+            <a:ext cx="2016345" cy="646331"/>
+          </a:xfrm>
+          <a:prstGeom prst="rect">
+            <a:avLst/>
+          </a:prstGeom>
+          <a:noFill/>
+        </p:spPr>
+        <p:txBody>
+          <a:bodyPr wrap="square" rtlCol="0">
+            <a:spAutoFit/>
+          </a:bodyPr>
+          <a:lstStyle/>
+          <a:p>
+            <a:r>
+              <a:rPr lang="en-US" dirty="0" err="1"/>
+              <a:t>Wanna</a:t>
+            </a:r>
+            <a:r>
+              <a:rPr lang="en-US" dirty="0"/>
+              <a:t> be a ASME National member? </a:t>
+            </a:r>
+          </a:p>
+        </p:txBody>
+      </p:sp>
+      <p:pic>
+        <p:nvPicPr>
+          <p:cNvPr id="22" name="Picture 21"/>
+          <p:cNvPicPr>
+            <a:picLocks noChangeAspect="1"/>
+          </p:cNvPicPr>
+          <p:nvPr/>
+        </p:nvPicPr>
+        <p:blipFill>
+          <a:blip r:embed="rId10"/>
+          <a:stretch>
+            <a:fillRect/>
+          </a:stretch>
+        </p:blipFill>
+        <p:spPr>
+          <a:xfrm>
+            <a:off x="4872147" y="5579371"/>
+            <a:ext cx="3248025" cy="238125"/>
+          </a:xfrm>
+          <a:prstGeom prst="rect">
+            <a:avLst/>
+          </a:prstGeom>
+        </p:spPr>
+      </p:pic>
+    </p:spTree>
+    <p:extLst>
+      <p:ext uri="{BB962C8B-B14F-4D97-AF65-F5344CB8AC3E}">
+        <p14:creationId xmlns:p14="http://schemas.microsoft.com/office/powerpoint/2010/main" val="2376000265"/>
+      </p:ext>
+    </p:extLst>
+  </p:cSld>
+  <p:clrMapOvr>
+    <a:masterClrMapping/>
+  </p:clrMapOvr>
+</p:sld>
+</file>
+
+<file path=ppt/slides/slide5.xml><?xml version="1.0" encoding="utf-8"?>
+<p:sld xmlns:a="http://schemas.openxmlformats.org/drawingml/2006/main" xmlns:r="http://schemas.openxmlformats.org/officeDocument/2006/relationships" xmlns:p="http://schemas.openxmlformats.org/presentationml/2006/main">
+  <p:cSld>
+    <p:spTree>
+      <p:nvGrpSpPr>
+        <p:cNvPr id="1" name=""/>
+        <p:cNvGrpSpPr/>
+        <p:nvPr/>
+      </p:nvGrpSpPr>
+      <p:grpSpPr>
+        <a:xfrm>
+          <a:off x="0" y="0"/>
+          <a:ext cx="0" cy="0"/>
+          <a:chOff x="0" y="0"/>
+          <a:chExt cx="0" cy="0"/>
+        </a:xfrm>
+      </p:grpSpPr>
+      <p:pic>
+        <p:nvPicPr>
+          <p:cNvPr id="4" name="Picture 3"/>
+          <p:cNvPicPr>
+            <a:picLocks noChangeAspect="1"/>
+          </p:cNvPicPr>
+          <p:nvPr/>
+        </p:nvPicPr>
+        <p:blipFill>
+          <a:blip r:embed="rId2"/>
+          <a:stretch>
+            <a:fillRect/>
+          </a:stretch>
+        </p:blipFill>
+        <p:spPr>
+          <a:xfrm>
+            <a:off x="593947" y="3010883"/>
+            <a:ext cx="3642414" cy="2400300"/>
+          </a:xfrm>
+          <a:prstGeom prst="rect">
+            <a:avLst/>
+          </a:prstGeom>
+        </p:spPr>
+      </p:pic>
+      <p:pic>
+        <p:nvPicPr>
+          <p:cNvPr id="5" name="Picture 4"/>
+          <p:cNvPicPr>
+            <a:picLocks noChangeAspect="1"/>
+          </p:cNvPicPr>
+          <p:nvPr/>
+        </p:nvPicPr>
+        <p:blipFill>
+          <a:blip r:embed="rId3"/>
+          <a:stretch>
+            <a:fillRect/>
+          </a:stretch>
+        </p:blipFill>
+        <p:spPr>
+          <a:xfrm>
+            <a:off x="0" y="0"/>
+            <a:ext cx="12192000" cy="384772"/>
+          </a:xfrm>
+          <a:prstGeom prst="rect">
+            <a:avLst/>
+          </a:prstGeom>
+        </p:spPr>
+      </p:pic>
+      <p:pic>
+        <p:nvPicPr>
+          <p:cNvPr id="6" name="Picture 5"/>
+          <p:cNvPicPr>
+            <a:picLocks noChangeAspect="1"/>
+          </p:cNvPicPr>
+          <p:nvPr/>
+        </p:nvPicPr>
+        <p:blipFill>
+          <a:blip r:embed="rId4"/>
+          <a:stretch>
+            <a:fillRect/>
+          </a:stretch>
+        </p:blipFill>
+        <p:spPr>
+          <a:xfrm>
+            <a:off x="6467585" y="13631920"/>
+            <a:ext cx="3833246" cy="3397307"/>
+          </a:xfrm>
+          <a:prstGeom prst="rect">
+            <a:avLst/>
+          </a:prstGeom>
+        </p:spPr>
+      </p:pic>
+      <p:sp>
+        <p:nvSpPr>
+          <p:cNvPr id="7" name="Rectangle 6"/>
+          <p:cNvSpPr/>
+          <p:nvPr/>
+        </p:nvSpPr>
+        <p:spPr>
+          <a:xfrm>
+            <a:off x="2415154" y="674470"/>
+            <a:ext cx="7361692" cy="1323439"/>
+          </a:xfrm>
+          <a:prstGeom prst="rect">
+            <a:avLst/>
+          </a:prstGeom>
+        </p:spPr>
+        <p:txBody>
+          <a:bodyPr wrap="square">
+            <a:spAutoFit/>
+          </a:bodyPr>
+          <a:lstStyle/>
+          <a:p>
+            <a:pPr algn="ctr"/>
+            <a:r>
+              <a:rPr lang="en-US" sz="4000" b="1" dirty="0"/>
+              <a:t>ASME: American Society of Mechanical Engineers</a:t>
+            </a:r>
+          </a:p>
+        </p:txBody>
+      </p:sp>
+      <p:pic>
+        <p:nvPicPr>
+          <p:cNvPr id="8" name="Picture 7"/>
+          <p:cNvPicPr>
+            <a:picLocks noChangeAspect="1"/>
+          </p:cNvPicPr>
+          <p:nvPr/>
+        </p:nvPicPr>
+        <p:blipFill>
+          <a:blip r:embed="rId5"/>
+          <a:stretch>
+            <a:fillRect/>
+          </a:stretch>
+        </p:blipFill>
+        <p:spPr>
+          <a:xfrm>
+            <a:off x="441138" y="5583704"/>
+            <a:ext cx="3948032" cy="1794560"/>
+          </a:xfrm>
+          <a:prstGeom prst="rect">
+            <a:avLst/>
+          </a:prstGeom>
+        </p:spPr>
+      </p:pic>
+      <p:pic>
+        <p:nvPicPr>
+          <p:cNvPr id="9" name="Picture 8"/>
+          <p:cNvPicPr>
+            <a:picLocks noChangeAspect="1"/>
+          </p:cNvPicPr>
+          <p:nvPr/>
+        </p:nvPicPr>
+        <p:blipFill>
+          <a:blip r:embed="rId6"/>
+          <a:stretch>
+            <a:fillRect/>
+          </a:stretch>
+        </p:blipFill>
+        <p:spPr>
+          <a:xfrm>
+            <a:off x="4979311" y="3029933"/>
+            <a:ext cx="6809794" cy="2381250"/>
+          </a:xfrm>
+          <a:prstGeom prst="rect">
+            <a:avLst/>
+          </a:prstGeom>
+        </p:spPr>
+      </p:pic>
+      <p:sp>
+        <p:nvSpPr>
+          <p:cNvPr id="10" name="TextBox 9"/>
+          <p:cNvSpPr txBox="1"/>
+          <p:nvPr/>
+        </p:nvSpPr>
+        <p:spPr>
+          <a:xfrm>
+            <a:off x="1005454" y="7806461"/>
+            <a:ext cx="4450439" cy="461665"/>
+          </a:xfrm>
+          <a:prstGeom prst="rect">
+            <a:avLst/>
+          </a:prstGeom>
+          <a:noFill/>
+        </p:spPr>
+        <p:txBody>
+          <a:bodyPr wrap="square" rtlCol="0">
+            <a:spAutoFit/>
+          </a:bodyPr>
+          <a:lstStyle/>
+          <a:p>
+            <a:r>
+              <a:rPr lang="en-US" sz="2400" dirty="0"/>
+              <a:t>ABOUT</a:t>
+            </a:r>
+            <a:r>
+              <a:rPr lang="en-US" dirty="0"/>
+              <a:t>:</a:t>
+            </a:r>
+          </a:p>
+        </p:txBody>
+      </p:sp>
+      <p:pic>
+        <p:nvPicPr>
+          <p:cNvPr id="11" name="Picture 10"/>
+          <p:cNvPicPr>
+            <a:picLocks noChangeAspect="1"/>
+          </p:cNvPicPr>
+          <p:nvPr/>
+        </p:nvPicPr>
+        <p:blipFill>
+          <a:blip r:embed="rId7"/>
+          <a:stretch>
+            <a:fillRect/>
+          </a:stretch>
+        </p:blipFill>
+        <p:spPr>
+          <a:xfrm>
+            <a:off x="2415153" y="8305601"/>
+            <a:ext cx="7437893" cy="4331846"/>
+          </a:xfrm>
+          <a:prstGeom prst="rect">
+            <a:avLst/>
+          </a:prstGeom>
+        </p:spPr>
+      </p:pic>
+      <p:sp>
+        <p:nvSpPr>
+          <p:cNvPr id="12" name="TextBox 11"/>
+          <p:cNvSpPr txBox="1"/>
+          <p:nvPr/>
+        </p:nvSpPr>
+        <p:spPr>
+          <a:xfrm>
+            <a:off x="863034" y="13305001"/>
+            <a:ext cx="4450439" cy="461665"/>
+          </a:xfrm>
+          <a:prstGeom prst="rect">
+            <a:avLst/>
+          </a:prstGeom>
+          <a:noFill/>
+        </p:spPr>
+        <p:txBody>
+          <a:bodyPr wrap="square" rtlCol="0">
+            <a:spAutoFit/>
+          </a:bodyPr>
+          <a:lstStyle/>
+          <a:p>
+            <a:r>
+              <a:rPr lang="en-US" sz="2400" dirty="0"/>
+              <a:t>COMPETITIONS</a:t>
+            </a:r>
+            <a:r>
+              <a:rPr lang="en-US" dirty="0"/>
+              <a:t>:</a:t>
+            </a:r>
+          </a:p>
+        </p:txBody>
+      </p:sp>
+      <p:sp>
+        <p:nvSpPr>
+          <p:cNvPr id="13" name="TextBox 12"/>
+          <p:cNvSpPr txBox="1"/>
+          <p:nvPr/>
+        </p:nvSpPr>
+        <p:spPr>
+          <a:xfrm>
+            <a:off x="1538854" y="13766666"/>
+            <a:ext cx="3098800" cy="2031325"/>
+          </a:xfrm>
+          <a:prstGeom prst="rect">
+            <a:avLst/>
+          </a:prstGeom>
+          <a:noFill/>
+        </p:spPr>
+        <p:txBody>
+          <a:bodyPr wrap="square" rtlCol="0">
+            <a:spAutoFit/>
+          </a:bodyPr>
+          <a:lstStyle/>
+          <a:p>
+            <a:r>
+              <a:rPr lang="en-US" dirty="0"/>
+              <a:t>IDSC THE CHALLENGE: </a:t>
+            </a:r>
+          </a:p>
+          <a:p>
+            <a:endParaRPr lang="en-US" dirty="0"/>
+          </a:p>
+          <a:p>
+            <a:r>
+              <a:rPr lang="en-US" dirty="0"/>
+              <a:t>DATE: MAY 1 2018</a:t>
+            </a:r>
+          </a:p>
+          <a:p>
+            <a:r>
+              <a:rPr lang="en-US" dirty="0"/>
+              <a:t>WHO: ASME MEMBERS</a:t>
+            </a:r>
+          </a:p>
+          <a:p>
+            <a:r>
+              <a:rPr lang="en-US" dirty="0"/>
+              <a:t>WHERE: TBD</a:t>
+            </a:r>
+          </a:p>
+          <a:p>
+            <a:endParaRPr lang="en-US" dirty="0"/>
+          </a:p>
+          <a:p>
+            <a:endParaRPr lang="en-US" dirty="0"/>
+          </a:p>
+        </p:txBody>
+      </p:sp>
+      <p:pic>
+        <p:nvPicPr>
+          <p:cNvPr id="14" name="Picture 13"/>
+          <p:cNvPicPr>
+            <a:picLocks noChangeAspect="1"/>
+          </p:cNvPicPr>
+          <p:nvPr/>
+        </p:nvPicPr>
+        <p:blipFill>
+          <a:blip r:embed="rId8"/>
+          <a:stretch>
+            <a:fillRect/>
+          </a:stretch>
+        </p:blipFill>
+        <p:spPr>
+          <a:xfrm>
+            <a:off x="6467585" y="17791134"/>
+            <a:ext cx="3305175" cy="6134100"/>
+          </a:xfrm>
+          <a:prstGeom prst="rect">
+            <a:avLst/>
+          </a:prstGeom>
+        </p:spPr>
+      </p:pic>
+      <p:sp>
+        <p:nvSpPr>
+          <p:cNvPr id="15" name="TextBox 14"/>
+          <p:cNvSpPr txBox="1"/>
+          <p:nvPr/>
+        </p:nvSpPr>
+        <p:spPr>
+          <a:xfrm>
+            <a:off x="1538854" y="17662078"/>
+            <a:ext cx="3098800" cy="2031325"/>
+          </a:xfrm>
+          <a:prstGeom prst="rect">
+            <a:avLst/>
+          </a:prstGeom>
+          <a:noFill/>
+        </p:spPr>
+        <p:txBody>
+          <a:bodyPr wrap="square" rtlCol="0">
+            <a:spAutoFit/>
+          </a:bodyPr>
+          <a:lstStyle/>
+          <a:p>
+            <a:r>
+              <a:rPr lang="en-US" dirty="0"/>
+              <a:t>THE ROBOT PENTATHLON</a:t>
+            </a:r>
+          </a:p>
+          <a:p>
+            <a:endParaRPr lang="en-US" dirty="0"/>
+          </a:p>
+          <a:p>
+            <a:r>
+              <a:rPr lang="en-US" dirty="0"/>
+              <a:t>DATE: JUNE 11 2018</a:t>
+            </a:r>
+          </a:p>
+          <a:p>
+            <a:r>
+              <a:rPr lang="en-US" dirty="0"/>
+              <a:t>WHO: ASME MEMBERS</a:t>
+            </a:r>
+          </a:p>
+          <a:p>
+            <a:r>
+              <a:rPr lang="en-US" dirty="0"/>
+              <a:t>WHERE: TBD</a:t>
+            </a:r>
+          </a:p>
+          <a:p>
+            <a:endParaRPr lang="en-US" dirty="0"/>
+          </a:p>
+          <a:p>
+            <a:endParaRPr lang="en-US" dirty="0"/>
+          </a:p>
+        </p:txBody>
+      </p:sp>
+      <p:pic>
+        <p:nvPicPr>
+          <p:cNvPr id="16" name="Picture 15"/>
+          <p:cNvPicPr>
+            <a:picLocks noChangeAspect="1"/>
+          </p:cNvPicPr>
+          <p:nvPr/>
+        </p:nvPicPr>
+        <p:blipFill>
+          <a:blip r:embed="rId9"/>
+          <a:stretch>
+            <a:fillRect/>
+          </a:stretch>
+        </p:blipFill>
+        <p:spPr>
+          <a:xfrm>
+            <a:off x="9552207" y="5985684"/>
+            <a:ext cx="2457450" cy="495300"/>
+          </a:xfrm>
+          <a:prstGeom prst="rect">
+            <a:avLst/>
+          </a:prstGeom>
+        </p:spPr>
+      </p:pic>
+      <p:sp>
+        <p:nvSpPr>
+          <p:cNvPr id="17" name="TextBox 16"/>
+          <p:cNvSpPr txBox="1"/>
+          <p:nvPr/>
+        </p:nvSpPr>
+        <p:spPr>
+          <a:xfrm>
+            <a:off x="9772760" y="5421647"/>
+            <a:ext cx="2016345" cy="646331"/>
+          </a:xfrm>
+          <a:prstGeom prst="rect">
+            <a:avLst/>
+          </a:prstGeom>
+          <a:noFill/>
+        </p:spPr>
+        <p:txBody>
+          <a:bodyPr wrap="square" rtlCol="0">
+            <a:spAutoFit/>
+          </a:bodyPr>
+          <a:lstStyle/>
+          <a:p>
+            <a:r>
+              <a:rPr lang="en-US" dirty="0" err="1"/>
+              <a:t>Wanna</a:t>
+            </a:r>
+            <a:r>
+              <a:rPr lang="en-US" dirty="0"/>
+              <a:t> be a ASME National member? </a:t>
+            </a:r>
+          </a:p>
+        </p:txBody>
+      </p:sp>
+      <p:pic>
+        <p:nvPicPr>
+          <p:cNvPr id="18" name="Picture 17"/>
+          <p:cNvPicPr>
+            <a:picLocks noChangeAspect="1"/>
+          </p:cNvPicPr>
+          <p:nvPr/>
+        </p:nvPicPr>
+        <p:blipFill>
+          <a:blip r:embed="rId10"/>
+          <a:stretch>
+            <a:fillRect/>
+          </a:stretch>
+        </p:blipFill>
+        <p:spPr>
+          <a:xfrm>
+            <a:off x="4872147" y="5579371"/>
+            <a:ext cx="3248025" cy="238125"/>
+          </a:xfrm>
+          <a:prstGeom prst="rect">
+            <a:avLst/>
+          </a:prstGeom>
+        </p:spPr>
+      </p:pic>
+    </p:spTree>
+    <p:extLst>
+      <p:ext uri="{BB962C8B-B14F-4D97-AF65-F5344CB8AC3E}">
+        <p14:creationId xmlns:p14="http://schemas.microsoft.com/office/powerpoint/2010/main" val="913404589"/>
       </p:ext>
     </p:extLst>
   </p:cSld>

</xml_diff>